<commit_message>
keyboard and structure samples
Added sample links to all keyboard and structure slides. Updated sample files to include fixes and desired failures, as described in Presentation_SampleList
</commit_message>
<xml_diff>
--- a/docs/ICT Symposium Intro and KeyboardCHANGES.pptx
+++ b/docs/ICT Symposium Intro and KeyboardCHANGES.pptx
@@ -5,7 +5,7 @@
     <p:sldMasterId id="2147483648" r:id="rId1"/>
   </p:sldMasterIdLst>
   <p:notesMasterIdLst>
-    <p:notesMasterId r:id="rId18"/>
+    <p:notesMasterId r:id="rId19"/>
   </p:notesMasterIdLst>
   <p:sldIdLst>
     <p:sldId id="256" r:id="rId2"/>
@@ -14,16 +14,17 @@
     <p:sldId id="289" r:id="rId5"/>
     <p:sldId id="268" r:id="rId6"/>
     <p:sldId id="290" r:id="rId7"/>
-    <p:sldId id="269" r:id="rId8"/>
-    <p:sldId id="270" r:id="rId9"/>
-    <p:sldId id="271" r:id="rId10"/>
-    <p:sldId id="272" r:id="rId11"/>
-    <p:sldId id="273" r:id="rId12"/>
-    <p:sldId id="274" r:id="rId13"/>
-    <p:sldId id="276" r:id="rId14"/>
-    <p:sldId id="283" r:id="rId15"/>
-    <p:sldId id="285" r:id="rId16"/>
-    <p:sldId id="288" r:id="rId17"/>
+    <p:sldId id="292" r:id="rId8"/>
+    <p:sldId id="269" r:id="rId9"/>
+    <p:sldId id="270" r:id="rId10"/>
+    <p:sldId id="271" r:id="rId11"/>
+    <p:sldId id="272" r:id="rId12"/>
+    <p:sldId id="273" r:id="rId13"/>
+    <p:sldId id="274" r:id="rId14"/>
+    <p:sldId id="276" r:id="rId15"/>
+    <p:sldId id="283" r:id="rId16"/>
+    <p:sldId id="285" r:id="rId17"/>
+    <p:sldId id="288" r:id="rId18"/>
   </p:sldIdLst>
   <p:sldSz cx="9144000" cy="6858000" type="screen4x3"/>
   <p:notesSz cx="6858000" cy="9144000"/>
@@ -122,6 +123,22 @@
       </a:defRPr>
     </a:lvl9pPr>
   </p:defaultTextStyle>
+  <p:extLst>
+    <p:ext uri="{EFAFB233-063F-42B5-8137-9DF3F51BA10A}">
+      <p15:sldGuideLst xmlns:p15="http://schemas.microsoft.com/office/powerpoint/2012/main">
+        <p15:guide id="1" orient="horz" pos="2160">
+          <p15:clr>
+            <a:srgbClr val="A4A3A4"/>
+          </p15:clr>
+        </p15:guide>
+        <p15:guide id="2" pos="2880">
+          <p15:clr>
+            <a:srgbClr val="A4A3A4"/>
+          </p15:clr>
+        </p15:guide>
+      </p15:sldGuideLst>
+    </p:ext>
+  </p:extLst>
 </p:presentation>
 </file>
 
@@ -207,7 +224,7 @@
           <a:p>
             <a:fld id="{E3EB4E53-8A43-4EFE-9530-A4A5F1F2CFD3}" type="datetimeFigureOut">
               <a:rPr lang="en-US" smtClean="0"/>
-              <a:t>9/21/2019</a:t>
+              <a:t>9/24/2019</a:t>
             </a:fld>
             <a:endParaRPr lang="en-US"/>
           </a:p>
@@ -271,38 +288,37 @@
           <a:p>
             <a:pPr lvl="0"/>
             <a:r>
-              <a:rPr lang="en-US" smtClean="0"/>
+              <a:rPr lang="en-US"/>
               <a:t>Click to edit Master text styles</a:t>
             </a:r>
           </a:p>
           <a:p>
             <a:pPr lvl="1"/>
             <a:r>
-              <a:rPr lang="en-US" smtClean="0"/>
+              <a:rPr lang="en-US"/>
               <a:t>Second level</a:t>
             </a:r>
           </a:p>
           <a:p>
             <a:pPr lvl="2"/>
             <a:r>
-              <a:rPr lang="en-US" smtClean="0"/>
+              <a:rPr lang="en-US"/>
               <a:t>Third level</a:t>
             </a:r>
           </a:p>
           <a:p>
             <a:pPr lvl="3"/>
             <a:r>
-              <a:rPr lang="en-US" smtClean="0"/>
+              <a:rPr lang="en-US"/>
               <a:t>Fourth level</a:t>
             </a:r>
           </a:p>
           <a:p>
             <a:pPr lvl="4"/>
             <a:r>
-              <a:rPr lang="en-US" smtClean="0"/>
+              <a:rPr lang="en-US"/>
               <a:t>Fifth level</a:t>
             </a:r>
-            <a:endParaRPr lang="en-US"/>
           </a:p>
         </p:txBody>
       </p:sp>
@@ -520,11 +536,11 @@
           <a:lstStyle/>
           <a:p>
             <a:r>
-              <a:rPr lang="en-US" dirty="0" smtClean="0"/>
+              <a:rPr lang="en-US" dirty="0"/>
               <a:t>Grand</a:t>
             </a:r>
             <a:r>
-              <a:rPr lang="en-US" baseline="0" dirty="0" smtClean="0"/>
+              <a:rPr lang="en-US" baseline="0" dirty="0"/>
               <a:t> Canyon site is an example of 4.F – move example</a:t>
             </a:r>
             <a:endParaRPr lang="en-US" dirty="0"/>
@@ -612,11 +628,11 @@
           <a:lstStyle/>
           <a:p>
             <a:r>
-              <a:rPr lang="en-US" dirty="0" smtClean="0"/>
+              <a:rPr lang="en-US" dirty="0"/>
               <a:t>Demo Topic</a:t>
             </a:r>
             <a:r>
-              <a:rPr lang="en-US" baseline="0" dirty="0" smtClean="0"/>
+              <a:rPr lang="en-US" baseline="0" dirty="0"/>
               <a:t> 4 video keyboard trap starting at 2:35</a:t>
             </a:r>
             <a:endParaRPr lang="en-US" dirty="0"/>
@@ -704,26 +720,25 @@
           <a:lstStyle/>
           <a:p>
             <a:r>
-              <a:rPr lang="en-US" dirty="0" smtClean="0"/>
+              <a:rPr lang="en-US" dirty="0"/>
               <a:t>Need failing and passing examples of visible focus. Passing examples should use</a:t>
             </a:r>
             <a:r>
-              <a:rPr lang="en-US" baseline="0" dirty="0" smtClean="0"/>
+              <a:rPr lang="en-US" baseline="0" dirty="0"/>
               <a:t> multiple methods, such as</a:t>
             </a:r>
             <a:r>
-              <a:rPr lang="en-US" dirty="0" smtClean="0"/>
+              <a:rPr lang="en-US" dirty="0"/>
               <a:t> shading</a:t>
             </a:r>
             <a:r>
-              <a:rPr lang="en-US" baseline="0" dirty="0" smtClean="0"/>
+              <a:rPr lang="en-US" baseline="0" dirty="0"/>
               <a:t> &amp;</a:t>
             </a:r>
             <a:r>
-              <a:rPr lang="en-US" dirty="0" smtClean="0"/>
+              <a:rPr lang="en-US" dirty="0"/>
               <a:t> outline</a:t>
             </a:r>
-            <a:endParaRPr lang="en-US" dirty="0"/>
           </a:p>
         </p:txBody>
       </p:sp>
@@ -744,7 +759,7 @@
           <a:p>
             <a:fld id="{5F9EDE19-A1F6-47F6-8700-E009ACE1A4D8}" type="slidenum">
               <a:rPr lang="en-US" smtClean="0"/>
-              <a:t>7</a:t>
+              <a:t>8</a:t>
             </a:fld>
             <a:endParaRPr lang="en-US"/>
           </a:p>
@@ -808,10 +823,9 @@
           <a:lstStyle/>
           <a:p>
             <a:r>
-              <a:rPr lang="en-US" dirty="0" smtClean="0"/>
+              <a:rPr lang="en-US" dirty="0"/>
               <a:t>Need example</a:t>
             </a:r>
-            <a:endParaRPr lang="en-US" dirty="0"/>
           </a:p>
         </p:txBody>
       </p:sp>
@@ -832,7 +846,7 @@
           <a:p>
             <a:fld id="{5F9EDE19-A1F6-47F6-8700-E009ACE1A4D8}" type="slidenum">
               <a:rPr lang="en-US" smtClean="0"/>
-              <a:t>8</a:t>
+              <a:t>9</a:t>
             </a:fld>
             <a:endParaRPr lang="en-US"/>
           </a:p>
@@ -896,10 +910,9 @@
           <a:lstStyle/>
           <a:p>
             <a:r>
-              <a:rPr lang="en-US" dirty="0" smtClean="0"/>
+              <a:rPr lang="en-US" dirty="0"/>
               <a:t>Need passing and failing example</a:t>
             </a:r>
-            <a:endParaRPr lang="en-US" dirty="0"/>
           </a:p>
         </p:txBody>
       </p:sp>
@@ -920,7 +933,7 @@
           <a:p>
             <a:fld id="{5F9EDE19-A1F6-47F6-8700-E009ACE1A4D8}" type="slidenum">
               <a:rPr lang="en-US" smtClean="0"/>
-              <a:t>9</a:t>
+              <a:t>10</a:t>
             </a:fld>
             <a:endParaRPr lang="en-US"/>
           </a:p>
@@ -1004,7 +1017,7 @@
           <a:p>
             <a:fld id="{5F9EDE19-A1F6-47F6-8700-E009ACE1A4D8}" type="slidenum">
               <a:rPr lang="en-US" smtClean="0"/>
-              <a:t>16</a:t>
+              <a:t>17</a:t>
             </a:fld>
             <a:endParaRPr lang="en-US"/>
           </a:p>
@@ -1061,10 +1074,9 @@
           <a:lstStyle/>
           <a:p>
             <a:r>
-              <a:rPr lang="en-US" smtClean="0"/>
+              <a:rPr lang="en-US"/>
               <a:t>Click to edit Master title style</a:t>
             </a:r>
-            <a:endParaRPr lang="en-US"/>
           </a:p>
         </p:txBody>
       </p:sp>
@@ -1180,10 +1192,9 @@
           </a:lstStyle>
           <a:p>
             <a:r>
-              <a:rPr lang="en-US" smtClean="0"/>
+              <a:rPr lang="en-US"/>
               <a:t>Click to edit Master subtitle style</a:t>
             </a:r>
-            <a:endParaRPr lang="en-US"/>
           </a:p>
         </p:txBody>
       </p:sp>
@@ -1204,7 +1215,7 @@
           <a:p>
             <a:fld id="{9D2458CD-B473-471D-9A84-90F4384C092D}" type="datetimeFigureOut">
               <a:rPr lang="en-US" smtClean="0"/>
-              <a:t>9/21/2019</a:t>
+              <a:t>9/24/2019</a:t>
             </a:fld>
             <a:endParaRPr lang="en-US"/>
           </a:p>
@@ -1298,10 +1309,9 @@
           <a:lstStyle/>
           <a:p>
             <a:r>
-              <a:rPr lang="en-US" smtClean="0"/>
+              <a:rPr lang="en-US"/>
               <a:t>Click to edit Master title style</a:t>
             </a:r>
-            <a:endParaRPr lang="en-US"/>
           </a:p>
         </p:txBody>
       </p:sp>
@@ -1322,38 +1332,37 @@
           <a:p>
             <a:pPr lvl="0"/>
             <a:r>
-              <a:rPr lang="en-US" smtClean="0"/>
+              <a:rPr lang="en-US"/>
               <a:t>Click to edit Master text styles</a:t>
             </a:r>
           </a:p>
           <a:p>
             <a:pPr lvl="1"/>
             <a:r>
-              <a:rPr lang="en-US" smtClean="0"/>
+              <a:rPr lang="en-US"/>
               <a:t>Second level</a:t>
             </a:r>
           </a:p>
           <a:p>
             <a:pPr lvl="2"/>
             <a:r>
-              <a:rPr lang="en-US" smtClean="0"/>
+              <a:rPr lang="en-US"/>
               <a:t>Third level</a:t>
             </a:r>
           </a:p>
           <a:p>
             <a:pPr lvl="3"/>
             <a:r>
-              <a:rPr lang="en-US" smtClean="0"/>
+              <a:rPr lang="en-US"/>
               <a:t>Fourth level</a:t>
             </a:r>
           </a:p>
           <a:p>
             <a:pPr lvl="4"/>
             <a:r>
-              <a:rPr lang="en-US" smtClean="0"/>
+              <a:rPr lang="en-US"/>
               <a:t>Fifth level</a:t>
             </a:r>
-            <a:endParaRPr lang="en-US"/>
           </a:p>
         </p:txBody>
       </p:sp>
@@ -1374,7 +1383,7 @@
           <a:p>
             <a:fld id="{9D2458CD-B473-471D-9A84-90F4384C092D}" type="datetimeFigureOut">
               <a:rPr lang="en-US" smtClean="0"/>
-              <a:t>9/21/2019</a:t>
+              <a:t>9/24/2019</a:t>
             </a:fld>
             <a:endParaRPr lang="en-US"/>
           </a:p>
@@ -1473,10 +1482,9 @@
           <a:lstStyle/>
           <a:p>
             <a:r>
-              <a:rPr lang="en-US" smtClean="0"/>
+              <a:rPr lang="en-US"/>
               <a:t>Click to edit Master title style</a:t>
             </a:r>
-            <a:endParaRPr lang="en-US"/>
           </a:p>
         </p:txBody>
       </p:sp>
@@ -1502,38 +1510,37 @@
           <a:p>
             <a:pPr lvl="0"/>
             <a:r>
-              <a:rPr lang="en-US" smtClean="0"/>
+              <a:rPr lang="en-US"/>
               <a:t>Click to edit Master text styles</a:t>
             </a:r>
           </a:p>
           <a:p>
             <a:pPr lvl="1"/>
             <a:r>
-              <a:rPr lang="en-US" smtClean="0"/>
+              <a:rPr lang="en-US"/>
               <a:t>Second level</a:t>
             </a:r>
           </a:p>
           <a:p>
             <a:pPr lvl="2"/>
             <a:r>
-              <a:rPr lang="en-US" smtClean="0"/>
+              <a:rPr lang="en-US"/>
               <a:t>Third level</a:t>
             </a:r>
           </a:p>
           <a:p>
             <a:pPr lvl="3"/>
             <a:r>
-              <a:rPr lang="en-US" smtClean="0"/>
+              <a:rPr lang="en-US"/>
               <a:t>Fourth level</a:t>
             </a:r>
           </a:p>
           <a:p>
             <a:pPr lvl="4"/>
             <a:r>
-              <a:rPr lang="en-US" smtClean="0"/>
+              <a:rPr lang="en-US"/>
               <a:t>Fifth level</a:t>
             </a:r>
-            <a:endParaRPr lang="en-US"/>
           </a:p>
         </p:txBody>
       </p:sp>
@@ -1554,7 +1561,7 @@
           <a:p>
             <a:fld id="{9D2458CD-B473-471D-9A84-90F4384C092D}" type="datetimeFigureOut">
               <a:rPr lang="en-US" smtClean="0"/>
-              <a:t>9/21/2019</a:t>
+              <a:t>9/24/2019</a:t>
             </a:fld>
             <a:endParaRPr lang="en-US"/>
           </a:p>
@@ -1648,10 +1655,9 @@
           <a:lstStyle/>
           <a:p>
             <a:r>
-              <a:rPr lang="en-US" smtClean="0"/>
+              <a:rPr lang="en-US"/>
               <a:t>Click to edit Master title style</a:t>
             </a:r>
-            <a:endParaRPr lang="en-US"/>
           </a:p>
         </p:txBody>
       </p:sp>
@@ -1672,38 +1678,37 @@
           <a:p>
             <a:pPr lvl="0"/>
             <a:r>
-              <a:rPr lang="en-US" smtClean="0"/>
+              <a:rPr lang="en-US"/>
               <a:t>Click to edit Master text styles</a:t>
             </a:r>
           </a:p>
           <a:p>
             <a:pPr lvl="1"/>
             <a:r>
-              <a:rPr lang="en-US" smtClean="0"/>
+              <a:rPr lang="en-US"/>
               <a:t>Second level</a:t>
             </a:r>
           </a:p>
           <a:p>
             <a:pPr lvl="2"/>
             <a:r>
-              <a:rPr lang="en-US" smtClean="0"/>
+              <a:rPr lang="en-US"/>
               <a:t>Third level</a:t>
             </a:r>
           </a:p>
           <a:p>
             <a:pPr lvl="3"/>
             <a:r>
-              <a:rPr lang="en-US" smtClean="0"/>
+              <a:rPr lang="en-US"/>
               <a:t>Fourth level</a:t>
             </a:r>
           </a:p>
           <a:p>
             <a:pPr lvl="4"/>
             <a:r>
-              <a:rPr lang="en-US" smtClean="0"/>
+              <a:rPr lang="en-US"/>
               <a:t>Fifth level</a:t>
             </a:r>
-            <a:endParaRPr lang="en-US"/>
           </a:p>
         </p:txBody>
       </p:sp>
@@ -1724,7 +1729,7 @@
           <a:p>
             <a:fld id="{9D2458CD-B473-471D-9A84-90F4384C092D}" type="datetimeFigureOut">
               <a:rPr lang="en-US" smtClean="0"/>
-              <a:t>9/21/2019</a:t>
+              <a:t>9/24/2019</a:t>
             </a:fld>
             <a:endParaRPr lang="en-US"/>
           </a:p>
@@ -1827,10 +1832,9 @@
           </a:lstStyle>
           <a:p>
             <a:r>
-              <a:rPr lang="en-US" smtClean="0"/>
+              <a:rPr lang="en-US"/>
               <a:t>Click to edit Master title style</a:t>
             </a:r>
-            <a:endParaRPr lang="en-US"/>
           </a:p>
         </p:txBody>
       </p:sp>
@@ -1947,7 +1951,7 @@
           <a:p>
             <a:pPr lvl="0"/>
             <a:r>
-              <a:rPr lang="en-US" smtClean="0"/>
+              <a:rPr lang="en-US"/>
               <a:t>Click to edit Master text styles</a:t>
             </a:r>
           </a:p>
@@ -1970,7 +1974,7 @@
           <a:p>
             <a:fld id="{9D2458CD-B473-471D-9A84-90F4384C092D}" type="datetimeFigureOut">
               <a:rPr lang="en-US" smtClean="0"/>
-              <a:t>9/21/2019</a:t>
+              <a:t>9/24/2019</a:t>
             </a:fld>
             <a:endParaRPr lang="en-US"/>
           </a:p>
@@ -2064,10 +2068,9 @@
           <a:lstStyle/>
           <a:p>
             <a:r>
-              <a:rPr lang="en-US" smtClean="0"/>
+              <a:rPr lang="en-US"/>
               <a:t>Click to edit Master title style</a:t>
             </a:r>
-            <a:endParaRPr lang="en-US"/>
           </a:p>
         </p:txBody>
       </p:sp>
@@ -2121,38 +2124,37 @@
           <a:p>
             <a:pPr lvl="0"/>
             <a:r>
-              <a:rPr lang="en-US" smtClean="0"/>
+              <a:rPr lang="en-US"/>
               <a:t>Click to edit Master text styles</a:t>
             </a:r>
           </a:p>
           <a:p>
             <a:pPr lvl="1"/>
             <a:r>
-              <a:rPr lang="en-US" smtClean="0"/>
+              <a:rPr lang="en-US"/>
               <a:t>Second level</a:t>
             </a:r>
           </a:p>
           <a:p>
             <a:pPr lvl="2"/>
             <a:r>
-              <a:rPr lang="en-US" smtClean="0"/>
+              <a:rPr lang="en-US"/>
               <a:t>Third level</a:t>
             </a:r>
           </a:p>
           <a:p>
             <a:pPr lvl="3"/>
             <a:r>
-              <a:rPr lang="en-US" smtClean="0"/>
+              <a:rPr lang="en-US"/>
               <a:t>Fourth level</a:t>
             </a:r>
           </a:p>
           <a:p>
             <a:pPr lvl="4"/>
             <a:r>
-              <a:rPr lang="en-US" smtClean="0"/>
+              <a:rPr lang="en-US"/>
               <a:t>Fifth level</a:t>
             </a:r>
-            <a:endParaRPr lang="en-US"/>
           </a:p>
         </p:txBody>
       </p:sp>
@@ -2206,38 +2208,37 @@
           <a:p>
             <a:pPr lvl="0"/>
             <a:r>
-              <a:rPr lang="en-US" smtClean="0"/>
+              <a:rPr lang="en-US"/>
               <a:t>Click to edit Master text styles</a:t>
             </a:r>
           </a:p>
           <a:p>
             <a:pPr lvl="1"/>
             <a:r>
-              <a:rPr lang="en-US" smtClean="0"/>
+              <a:rPr lang="en-US"/>
               <a:t>Second level</a:t>
             </a:r>
           </a:p>
           <a:p>
             <a:pPr lvl="2"/>
             <a:r>
-              <a:rPr lang="en-US" smtClean="0"/>
+              <a:rPr lang="en-US"/>
               <a:t>Third level</a:t>
             </a:r>
           </a:p>
           <a:p>
             <a:pPr lvl="3"/>
             <a:r>
-              <a:rPr lang="en-US" smtClean="0"/>
+              <a:rPr lang="en-US"/>
               <a:t>Fourth level</a:t>
             </a:r>
           </a:p>
           <a:p>
             <a:pPr lvl="4"/>
             <a:r>
-              <a:rPr lang="en-US" smtClean="0"/>
+              <a:rPr lang="en-US"/>
               <a:t>Fifth level</a:t>
             </a:r>
-            <a:endParaRPr lang="en-US"/>
           </a:p>
         </p:txBody>
       </p:sp>
@@ -2258,7 +2259,7 @@
           <a:p>
             <a:fld id="{9D2458CD-B473-471D-9A84-90F4384C092D}" type="datetimeFigureOut">
               <a:rPr lang="en-US" smtClean="0"/>
-              <a:t>9/21/2019</a:t>
+              <a:t>9/24/2019</a:t>
             </a:fld>
             <a:endParaRPr lang="en-US"/>
           </a:p>
@@ -2356,10 +2357,9 @@
           </a:lstStyle>
           <a:p>
             <a:r>
-              <a:rPr lang="en-US" smtClean="0"/>
+              <a:rPr lang="en-US"/>
               <a:t>Click to edit Master title style</a:t>
             </a:r>
-            <a:endParaRPr lang="en-US"/>
           </a:p>
         </p:txBody>
       </p:sp>
@@ -2422,7 +2422,7 @@
           <a:p>
             <a:pPr lvl="0"/>
             <a:r>
-              <a:rPr lang="en-US" smtClean="0"/>
+              <a:rPr lang="en-US"/>
               <a:t>Click to edit Master text styles</a:t>
             </a:r>
           </a:p>
@@ -2478,38 +2478,37 @@
           <a:p>
             <a:pPr lvl="0"/>
             <a:r>
-              <a:rPr lang="en-US" smtClean="0"/>
+              <a:rPr lang="en-US"/>
               <a:t>Click to edit Master text styles</a:t>
             </a:r>
           </a:p>
           <a:p>
             <a:pPr lvl="1"/>
             <a:r>
-              <a:rPr lang="en-US" smtClean="0"/>
+              <a:rPr lang="en-US"/>
               <a:t>Second level</a:t>
             </a:r>
           </a:p>
           <a:p>
             <a:pPr lvl="2"/>
             <a:r>
-              <a:rPr lang="en-US" smtClean="0"/>
+              <a:rPr lang="en-US"/>
               <a:t>Third level</a:t>
             </a:r>
           </a:p>
           <a:p>
             <a:pPr lvl="3"/>
             <a:r>
-              <a:rPr lang="en-US" smtClean="0"/>
+              <a:rPr lang="en-US"/>
               <a:t>Fourth level</a:t>
             </a:r>
           </a:p>
           <a:p>
             <a:pPr lvl="4"/>
             <a:r>
-              <a:rPr lang="en-US" smtClean="0"/>
+              <a:rPr lang="en-US"/>
               <a:t>Fifth level</a:t>
             </a:r>
-            <a:endParaRPr lang="en-US"/>
           </a:p>
         </p:txBody>
       </p:sp>
@@ -2572,7 +2571,7 @@
           <a:p>
             <a:pPr lvl="0"/>
             <a:r>
-              <a:rPr lang="en-US" smtClean="0"/>
+              <a:rPr lang="en-US"/>
               <a:t>Click to edit Master text styles</a:t>
             </a:r>
           </a:p>
@@ -2628,38 +2627,37 @@
           <a:p>
             <a:pPr lvl="0"/>
             <a:r>
-              <a:rPr lang="en-US" smtClean="0"/>
+              <a:rPr lang="en-US"/>
               <a:t>Click to edit Master text styles</a:t>
             </a:r>
           </a:p>
           <a:p>
             <a:pPr lvl="1"/>
             <a:r>
-              <a:rPr lang="en-US" smtClean="0"/>
+              <a:rPr lang="en-US"/>
               <a:t>Second level</a:t>
             </a:r>
           </a:p>
           <a:p>
             <a:pPr lvl="2"/>
             <a:r>
-              <a:rPr lang="en-US" smtClean="0"/>
+              <a:rPr lang="en-US"/>
               <a:t>Third level</a:t>
             </a:r>
           </a:p>
           <a:p>
             <a:pPr lvl="3"/>
             <a:r>
-              <a:rPr lang="en-US" smtClean="0"/>
+              <a:rPr lang="en-US"/>
               <a:t>Fourth level</a:t>
             </a:r>
           </a:p>
           <a:p>
             <a:pPr lvl="4"/>
             <a:r>
-              <a:rPr lang="en-US" smtClean="0"/>
+              <a:rPr lang="en-US"/>
               <a:t>Fifth level</a:t>
             </a:r>
-            <a:endParaRPr lang="en-US"/>
           </a:p>
         </p:txBody>
       </p:sp>
@@ -2680,7 +2678,7 @@
           <a:p>
             <a:fld id="{9D2458CD-B473-471D-9A84-90F4384C092D}" type="datetimeFigureOut">
               <a:rPr lang="en-US" smtClean="0"/>
-              <a:t>9/21/2019</a:t>
+              <a:t>9/24/2019</a:t>
             </a:fld>
             <a:endParaRPr lang="en-US"/>
           </a:p>
@@ -2774,10 +2772,9 @@
           <a:lstStyle/>
           <a:p>
             <a:r>
-              <a:rPr lang="en-US" smtClean="0"/>
+              <a:rPr lang="en-US"/>
               <a:t>Click to edit Master title style</a:t>
             </a:r>
-            <a:endParaRPr lang="en-US"/>
           </a:p>
         </p:txBody>
       </p:sp>
@@ -2798,7 +2795,7 @@
           <a:p>
             <a:fld id="{9D2458CD-B473-471D-9A84-90F4384C092D}" type="datetimeFigureOut">
               <a:rPr lang="en-US" smtClean="0"/>
-              <a:t>9/21/2019</a:t>
+              <a:t>9/24/2019</a:t>
             </a:fld>
             <a:endParaRPr lang="en-US"/>
           </a:p>
@@ -2893,7 +2890,7 @@
           <a:p>
             <a:fld id="{9D2458CD-B473-471D-9A84-90F4384C092D}" type="datetimeFigureOut">
               <a:rPr lang="en-US" smtClean="0"/>
-              <a:t>9/21/2019</a:t>
+              <a:t>9/24/2019</a:t>
             </a:fld>
             <a:endParaRPr lang="en-US"/>
           </a:p>
@@ -2996,10 +2993,9 @@
           </a:lstStyle>
           <a:p>
             <a:r>
-              <a:rPr lang="en-US" smtClean="0"/>
+              <a:rPr lang="en-US"/>
               <a:t>Click to edit Master title style</a:t>
             </a:r>
-            <a:endParaRPr lang="en-US"/>
           </a:p>
         </p:txBody>
       </p:sp>
@@ -3053,38 +3049,37 @@
           <a:p>
             <a:pPr lvl="0"/>
             <a:r>
-              <a:rPr lang="en-US" smtClean="0"/>
+              <a:rPr lang="en-US"/>
               <a:t>Click to edit Master text styles</a:t>
             </a:r>
           </a:p>
           <a:p>
             <a:pPr lvl="1"/>
             <a:r>
-              <a:rPr lang="en-US" smtClean="0"/>
+              <a:rPr lang="en-US"/>
               <a:t>Second level</a:t>
             </a:r>
           </a:p>
           <a:p>
             <a:pPr lvl="2"/>
             <a:r>
-              <a:rPr lang="en-US" smtClean="0"/>
+              <a:rPr lang="en-US"/>
               <a:t>Third level</a:t>
             </a:r>
           </a:p>
           <a:p>
             <a:pPr lvl="3"/>
             <a:r>
-              <a:rPr lang="en-US" smtClean="0"/>
+              <a:rPr lang="en-US"/>
               <a:t>Fourth level</a:t>
             </a:r>
           </a:p>
           <a:p>
             <a:pPr lvl="4"/>
             <a:r>
-              <a:rPr lang="en-US" smtClean="0"/>
+              <a:rPr lang="en-US"/>
               <a:t>Fifth level</a:t>
             </a:r>
-            <a:endParaRPr lang="en-US"/>
           </a:p>
         </p:txBody>
       </p:sp>
@@ -3147,7 +3142,7 @@
           <a:p>
             <a:pPr lvl="0"/>
             <a:r>
-              <a:rPr lang="en-US" smtClean="0"/>
+              <a:rPr lang="en-US"/>
               <a:t>Click to edit Master text styles</a:t>
             </a:r>
           </a:p>
@@ -3170,7 +3165,7 @@
           <a:p>
             <a:fld id="{9D2458CD-B473-471D-9A84-90F4384C092D}" type="datetimeFigureOut">
               <a:rPr lang="en-US" smtClean="0"/>
-              <a:t>9/21/2019</a:t>
+              <a:t>9/24/2019</a:t>
             </a:fld>
             <a:endParaRPr lang="en-US"/>
           </a:p>
@@ -3273,10 +3268,9 @@
           </a:lstStyle>
           <a:p>
             <a:r>
-              <a:rPr lang="en-US" smtClean="0"/>
+              <a:rPr lang="en-US"/>
               <a:t>Click to edit Master title style</a:t>
             </a:r>
-            <a:endParaRPr lang="en-US"/>
           </a:p>
         </p:txBody>
       </p:sp>
@@ -3400,7 +3394,7 @@
           <a:p>
             <a:pPr lvl="0"/>
             <a:r>
-              <a:rPr lang="en-US" smtClean="0"/>
+              <a:rPr lang="en-US"/>
               <a:t>Click to edit Master text styles</a:t>
             </a:r>
           </a:p>
@@ -3423,7 +3417,7 @@
           <a:p>
             <a:fld id="{9D2458CD-B473-471D-9A84-90F4384C092D}" type="datetimeFigureOut">
               <a:rPr lang="en-US" smtClean="0"/>
-              <a:t>9/21/2019</a:t>
+              <a:t>9/24/2019</a:t>
             </a:fld>
             <a:endParaRPr lang="en-US"/>
           </a:p>
@@ -3532,10 +3526,9 @@
           <a:lstStyle/>
           <a:p>
             <a:r>
-              <a:rPr lang="en-US" smtClean="0"/>
+              <a:rPr lang="en-US"/>
               <a:t>Click to edit Master title style</a:t>
             </a:r>
-            <a:endParaRPr lang="en-US"/>
           </a:p>
         </p:txBody>
       </p:sp>
@@ -3566,38 +3559,37 @@
           <a:p>
             <a:pPr lvl="0"/>
             <a:r>
-              <a:rPr lang="en-US" smtClean="0"/>
+              <a:rPr lang="en-US"/>
               <a:t>Click to edit Master text styles</a:t>
             </a:r>
           </a:p>
           <a:p>
             <a:pPr lvl="1"/>
             <a:r>
-              <a:rPr lang="en-US" smtClean="0"/>
+              <a:rPr lang="en-US"/>
               <a:t>Second level</a:t>
             </a:r>
           </a:p>
           <a:p>
             <a:pPr lvl="2"/>
             <a:r>
-              <a:rPr lang="en-US" smtClean="0"/>
+              <a:rPr lang="en-US"/>
               <a:t>Third level</a:t>
             </a:r>
           </a:p>
           <a:p>
             <a:pPr lvl="3"/>
             <a:r>
-              <a:rPr lang="en-US" smtClean="0"/>
+              <a:rPr lang="en-US"/>
               <a:t>Fourth level</a:t>
             </a:r>
           </a:p>
           <a:p>
             <a:pPr lvl="4"/>
             <a:r>
-              <a:rPr lang="en-US" smtClean="0"/>
+              <a:rPr lang="en-US"/>
               <a:t>Fifth level</a:t>
             </a:r>
-            <a:endParaRPr lang="en-US"/>
           </a:p>
         </p:txBody>
       </p:sp>
@@ -3636,7 +3628,7 @@
           <a:p>
             <a:fld id="{9D2458CD-B473-471D-9A84-90F4384C092D}" type="datetimeFigureOut">
               <a:rPr lang="en-US" smtClean="0"/>
-              <a:t>9/21/2019</a:t>
+              <a:t>9/24/2019</a:t>
             </a:fld>
             <a:endParaRPr lang="en-US"/>
           </a:p>
@@ -4027,10 +4019,9 @@
           <a:lstStyle/>
           <a:p>
             <a:r>
-              <a:rPr lang="en-US" dirty="0" smtClean="0"/>
+              <a:rPr lang="en-US" dirty="0"/>
               <a:t>ICT Symposium</a:t>
             </a:r>
-            <a:endParaRPr lang="en-US" dirty="0"/>
           </a:p>
         </p:txBody>
       </p:sp>
@@ -4050,20 +4041,15 @@
           <a:lstStyle/>
           <a:p>
             <a:r>
-              <a:rPr lang="en-US" dirty="0" smtClean="0"/>
-              <a:t>Trusted Tester Testing </a:t>
-            </a:r>
-            <a:r>
-              <a:rPr lang="en-US" dirty="0" smtClean="0"/>
-              <a:t>Workshop</a:t>
-            </a:r>
-          </a:p>
-          <a:p>
-            <a:r>
-              <a:rPr lang="en-US" dirty="0" smtClean="0"/>
+              <a:rPr lang="en-US" dirty="0"/>
+              <a:t>Trusted Tester Testing Workshop</a:t>
+            </a:r>
+          </a:p>
+          <a:p>
+            <a:r>
+              <a:rPr lang="en-US" dirty="0"/>
               <a:t>CHANGES</a:t>
             </a:r>
-            <a:endParaRPr lang="en-US" dirty="0"/>
           </a:p>
         </p:txBody>
       </p:sp>
@@ -4114,149 +4100,12 @@
           </a:xfrm>
         </p:spPr>
         <p:txBody>
-          <a:bodyPr>
-            <a:normAutofit/>
-          </a:bodyPr>
-          <a:lstStyle/>
-          <a:p>
-            <a:r>
-              <a:rPr lang="en-US" dirty="0" smtClean="0"/>
-              <a:t>Tips for Focus Order</a:t>
-            </a:r>
-            <a:endParaRPr lang="en-US" dirty="0"/>
-          </a:p>
-        </p:txBody>
-      </p:sp>
-      <p:sp>
-        <p:nvSpPr>
-          <p:cNvPr id="8" name="Content Placeholder 7"/>
-          <p:cNvSpPr txBox="1">
-            <a:spLocks noGrp="1"/>
-          </p:cNvSpPr>
-          <p:nvPr>
-            <p:ph sz="half" idx="2"/>
-          </p:nvPr>
-        </p:nvSpPr>
-        <p:spPr>
-          <a:xfrm>
-            <a:off x="990600" y="1600200"/>
-            <a:ext cx="7772400" cy="2677656"/>
-          </a:xfrm>
-          <a:prstGeom prst="rect">
-            <a:avLst/>
-          </a:prstGeom>
-          <a:solidFill>
-            <a:schemeClr val="tx2">
-              <a:lumMod val="20000"/>
-              <a:lumOff val="80000"/>
-            </a:schemeClr>
-          </a:solidFill>
-          <a:ln w="22225">
-            <a:solidFill>
-              <a:schemeClr val="tx2">
-                <a:lumMod val="75000"/>
-              </a:schemeClr>
-            </a:solidFill>
-          </a:ln>
-        </p:spPr>
-        <p:txBody>
-          <a:bodyPr wrap="square" rtlCol="0">
-            <a:spAutoFit/>
-          </a:bodyPr>
-          <a:lstStyle/>
-          <a:p>
-            <a:pPr marL="0" indent="0">
-              <a:spcBef>
-                <a:spcPts val="1200"/>
-              </a:spcBef>
-              <a:buNone/>
-            </a:pPr>
-            <a:r>
-              <a:rPr lang="en-US" sz="2000" b="1" u="sng" dirty="0" smtClean="0"/>
-              <a:t>Tips</a:t>
-            </a:r>
-            <a:endParaRPr lang="en-US" sz="2000" b="1" u="sng" dirty="0"/>
-          </a:p>
-          <a:p>
-            <a:pPr marL="457200" lvl="0" indent="-457200">
-              <a:buFont typeface="+mj-lt"/>
-              <a:buAutoNum type="arabicPeriod"/>
-            </a:pPr>
-            <a:r>
-              <a:rPr lang="en-US" sz="2000" dirty="0" smtClean="0"/>
-              <a:t>Focus </a:t>
-            </a:r>
-            <a:r>
-              <a:rPr lang="en-US" sz="2000" dirty="0"/>
-              <a:t>on an element should not bring an unexpected change – user needs to select the interface component to initiate the change = a new window is launched, or focus is moved to another interface component. </a:t>
-            </a:r>
-            <a:endParaRPr lang="en-US" sz="2000" dirty="0" smtClean="0"/>
-          </a:p>
-          <a:p>
-            <a:pPr marL="457200" lvl="0" indent="-457200">
-              <a:buFont typeface="+mj-lt"/>
-              <a:buAutoNum type="arabicPeriod"/>
-            </a:pPr>
-            <a:r>
-              <a:rPr lang="en-US" sz="2000" dirty="0" smtClean="0"/>
-              <a:t>It is key to understand the difference between a change of content and a change in context.  Applying this concept also impacts testing for forms in Topic 5 of the test process. </a:t>
-            </a:r>
-          </a:p>
-        </p:txBody>
-      </p:sp>
-    </p:spTree>
-    <p:extLst>
-      <p:ext uri="{BB962C8B-B14F-4D97-AF65-F5344CB8AC3E}">
-        <p14:creationId xmlns:p14="http://schemas.microsoft.com/office/powerpoint/2010/main" val="3986731837"/>
-      </p:ext>
-    </p:extLst>
-  </p:cSld>
-  <p:clrMapOvr>
-    <a:masterClrMapping/>
-  </p:clrMapOvr>
-</p:sld>
-</file>
-
-<file path=ppt/slides/slide11.xml><?xml version="1.0" encoding="utf-8"?>
-<p:sld xmlns:a="http://schemas.openxmlformats.org/drawingml/2006/main" xmlns:r="http://schemas.openxmlformats.org/officeDocument/2006/relationships" xmlns:p="http://schemas.openxmlformats.org/presentationml/2006/main">
-  <p:cSld>
-    <p:spTree>
-      <p:nvGrpSpPr>
-        <p:cNvPr id="1" name=""/>
-        <p:cNvGrpSpPr/>
-        <p:nvPr/>
-      </p:nvGrpSpPr>
-      <p:grpSpPr>
-        <a:xfrm>
-          <a:off x="0" y="0"/>
-          <a:ext cx="0" cy="0"/>
-          <a:chOff x="0" y="0"/>
-          <a:chExt cx="0" cy="0"/>
-        </a:xfrm>
-      </p:grpSpPr>
-      <p:sp>
-        <p:nvSpPr>
-          <p:cNvPr id="2" name="Title 1"/>
-          <p:cNvSpPr>
-            <a:spLocks noGrp="1"/>
-          </p:cNvSpPr>
-          <p:nvPr>
-            <p:ph type="title"/>
-          </p:nvPr>
-        </p:nvSpPr>
-        <p:spPr>
-          <a:xfrm>
-            <a:off x="457200" y="0"/>
-            <a:ext cx="8229600" cy="1143000"/>
-          </a:xfrm>
-        </p:spPr>
-        <p:txBody>
           <a:bodyPr/>
           <a:lstStyle/>
           <a:p>
             <a:r>
               <a:rPr lang="en-US" dirty="0"/>
-              <a:t>4.F 2.4.3-focus-order-meaning</a:t>
+              <a:t>4.E 3.2.1-on-focus</a:t>
             </a:r>
           </a:p>
         </p:txBody>
@@ -4271,7 +4120,7 @@
             <p:ph sz="half" idx="1"/>
             <p:extLst>
               <p:ext uri="{D42A27DB-BD31-4B8C-83A1-F6EECF244321}">
-                <p14:modId xmlns:p14="http://schemas.microsoft.com/office/powerpoint/2010/main" val="4265428286"/>
+                <p14:modId xmlns:p14="http://schemas.microsoft.com/office/powerpoint/2010/main" val="1532220904"/>
               </p:ext>
             </p:extLst>
           </p:nvPr>
@@ -4287,9 +4136,27 @@
                 <a:tableStyleId>{5C22544A-7EE6-4342-B048-85BDC9FD1C3A}</a:tableStyleId>
               </a:tblPr>
               <a:tblGrid>
-                <a:gridCol w="1600200"/>
-                <a:gridCol w="838200"/>
-                <a:gridCol w="5791200"/>
+                <a:gridCol w="1183197">
+                  <a:extLst>
+                    <a:ext uri="{9D8B030D-6E8A-4147-A177-3AD203B41FA5}">
+                      <a16:colId xmlns:a16="http://schemas.microsoft.com/office/drawing/2014/main" val="20000"/>
+                    </a:ext>
+                  </a:extLst>
+                </a:gridCol>
+                <a:gridCol w="712558">
+                  <a:extLst>
+                    <a:ext uri="{9D8B030D-6E8A-4147-A177-3AD203B41FA5}">
+                      <a16:colId xmlns:a16="http://schemas.microsoft.com/office/drawing/2014/main" val="20001"/>
+                    </a:ext>
+                  </a:extLst>
+                </a:gridCol>
+                <a:gridCol w="6333845">
+                  <a:extLst>
+                    <a:ext uri="{9D8B030D-6E8A-4147-A177-3AD203B41FA5}">
+                      <a16:colId xmlns:a16="http://schemas.microsoft.com/office/drawing/2014/main" val="20002"/>
+                    </a:ext>
+                  </a:extLst>
+                </a:gridCol>
               </a:tblGrid>
               <a:tr h="274320">
                 <a:tc>
@@ -4418,6 +4285,11 @@
                     </a:lnB>
                   </a:tcPr>
                 </a:tc>
+                <a:extLst>
+                  <a:ext uri="{0D108BD9-81ED-4DB2-BD59-A6C34878D82A}">
+                    <a16:rowId xmlns:a16="http://schemas.microsoft.com/office/drawing/2014/main" val="10000"/>
+                  </a:ext>
+                </a:extLst>
               </a:tr>
               <a:tr h="640080">
                 <a:tc>
@@ -4437,7 +4309,766 @@
                         </a:spcAft>
                       </a:pPr>
                       <a:r>
-                        <a:rPr lang="en-US" sz="1600" dirty="0" smtClean="0">
+                        <a:rPr lang="en-US" sz="1600" dirty="0">
+                          <a:solidFill>
+                            <a:schemeClr val="tx1"/>
+                          </a:solidFill>
+                          <a:effectLst/>
+                        </a:rPr>
+                        <a:t>3.2.1-on-focus</a:t>
+                      </a:r>
+                      <a:endParaRPr lang="en-US" sz="1600" dirty="0">
+                        <a:solidFill>
+                          <a:schemeClr val="tx1"/>
+                        </a:solidFill>
+                        <a:effectLst/>
+                        <a:latin typeface="Calibri"/>
+                        <a:ea typeface="Calibri"/>
+                        <a:cs typeface="Times New Roman"/>
+                      </a:endParaRPr>
+                    </a:p>
+                  </a:txBody>
+                  <a:tcPr marL="46599" marR="46599" marT="0" marB="0">
+                    <a:lnL w="12700" cap="flat" cmpd="sng" algn="ctr">
+                      <a:solidFill>
+                        <a:schemeClr val="tx1"/>
+                      </a:solidFill>
+                      <a:prstDash val="solid"/>
+                      <a:round/>
+                      <a:headEnd type="none" w="med" len="med"/>
+                      <a:tailEnd type="none" w="med" len="med"/>
+                    </a:lnL>
+                    <a:lnT w="12700" cap="flat" cmpd="sng" algn="ctr">
+                      <a:solidFill>
+                        <a:schemeClr val="tx1"/>
+                      </a:solidFill>
+                      <a:prstDash val="solid"/>
+                      <a:round/>
+                      <a:headEnd type="none" w="med" len="med"/>
+                      <a:tailEnd type="none" w="med" len="med"/>
+                    </a:lnT>
+                    <a:lnB w="12700" cap="flat" cmpd="sng" algn="ctr">
+                      <a:solidFill>
+                        <a:schemeClr val="tx1"/>
+                      </a:solidFill>
+                      <a:prstDash val="solid"/>
+                      <a:round/>
+                      <a:headEnd type="none" w="med" len="med"/>
+                      <a:tailEnd type="none" w="med" len="med"/>
+                    </a:lnB>
+                    <a:noFill/>
+                  </a:tcPr>
+                </a:tc>
+                <a:tc>
+                  <a:txBody>
+                    <a:bodyPr/>
+                    <a:lstStyle/>
+                    <a:p>
+                      <a:pPr marL="0" marR="0">
+                        <a:lnSpc>
+                          <a:spcPct val="107000"/>
+                        </a:lnSpc>
+                        <a:spcBef>
+                          <a:spcPts val="0"/>
+                        </a:spcBef>
+                        <a:spcAft>
+                          <a:spcPts val="0"/>
+                        </a:spcAft>
+                      </a:pPr>
+                      <a:r>
+                        <a:rPr lang="en-US" sz="1600" dirty="0">
+                          <a:solidFill>
+                            <a:schemeClr val="tx1"/>
+                          </a:solidFill>
+                          <a:effectLst/>
+                        </a:rPr>
+                        <a:t>4.E</a:t>
+                      </a:r>
+                      <a:endParaRPr lang="en-US" sz="1600" dirty="0">
+                        <a:solidFill>
+                          <a:schemeClr val="tx1"/>
+                        </a:solidFill>
+                        <a:effectLst/>
+                        <a:latin typeface="Calibri"/>
+                        <a:ea typeface="Calibri"/>
+                        <a:cs typeface="Times New Roman"/>
+                      </a:endParaRPr>
+                    </a:p>
+                  </a:txBody>
+                  <a:tcPr marL="46599" marR="46599" marT="0" marB="0">
+                    <a:lnT w="12700" cap="flat" cmpd="sng" algn="ctr">
+                      <a:solidFill>
+                        <a:schemeClr val="tx1"/>
+                      </a:solidFill>
+                      <a:prstDash val="solid"/>
+                      <a:round/>
+                      <a:headEnd type="none" w="med" len="med"/>
+                      <a:tailEnd type="none" w="med" len="med"/>
+                    </a:lnT>
+                    <a:lnB w="12700" cap="flat" cmpd="sng" algn="ctr">
+                      <a:solidFill>
+                        <a:schemeClr val="tx1"/>
+                      </a:solidFill>
+                      <a:prstDash val="solid"/>
+                      <a:round/>
+                      <a:headEnd type="none" w="med" len="med"/>
+                      <a:tailEnd type="none" w="med" len="med"/>
+                    </a:lnB>
+                    <a:noFill/>
+                  </a:tcPr>
+                </a:tc>
+                <a:tc>
+                  <a:txBody>
+                    <a:bodyPr/>
+                    <a:lstStyle/>
+                    <a:p>
+                      <a:pPr marL="0" marR="0">
+                        <a:spcBef>
+                          <a:spcPts val="0"/>
+                        </a:spcBef>
+                        <a:spcAft>
+                          <a:spcPts val="0"/>
+                        </a:spcAft>
+                      </a:pPr>
+                      <a:r>
+                        <a:rPr lang="en-US" sz="1600" dirty="0">
+                          <a:solidFill>
+                            <a:schemeClr val="tx1"/>
+                          </a:solidFill>
+                          <a:effectLst/>
+                        </a:rPr>
+                        <a:t>When an interface component receives focus, it does not initiate an unexpected change of context. </a:t>
+                      </a:r>
+                      <a:endParaRPr lang="en-US" sz="1600" b="1" dirty="0">
+                        <a:solidFill>
+                          <a:schemeClr val="tx1"/>
+                        </a:solidFill>
+                        <a:effectLst/>
+                        <a:latin typeface="Calibri"/>
+                        <a:ea typeface="Calibri"/>
+                        <a:cs typeface="Times New Roman"/>
+                      </a:endParaRPr>
+                    </a:p>
+                  </a:txBody>
+                  <a:tcPr marL="46599" marR="46599" marT="0" marB="0">
+                    <a:lnR w="12700" cap="flat" cmpd="sng" algn="ctr">
+                      <a:solidFill>
+                        <a:schemeClr val="tx1"/>
+                      </a:solidFill>
+                      <a:prstDash val="solid"/>
+                      <a:round/>
+                      <a:headEnd type="none" w="med" len="med"/>
+                      <a:tailEnd type="none" w="med" len="med"/>
+                    </a:lnR>
+                    <a:lnT w="12700" cap="flat" cmpd="sng" algn="ctr">
+                      <a:solidFill>
+                        <a:schemeClr val="tx1"/>
+                      </a:solidFill>
+                      <a:prstDash val="solid"/>
+                      <a:round/>
+                      <a:headEnd type="none" w="med" len="med"/>
+                      <a:tailEnd type="none" w="med" len="med"/>
+                    </a:lnT>
+                    <a:lnB w="12700" cap="flat" cmpd="sng" algn="ctr">
+                      <a:solidFill>
+                        <a:schemeClr val="tx1"/>
+                      </a:solidFill>
+                      <a:prstDash val="solid"/>
+                      <a:round/>
+                      <a:headEnd type="none" w="med" len="med"/>
+                      <a:tailEnd type="none" w="med" len="med"/>
+                    </a:lnB>
+                    <a:noFill/>
+                  </a:tcPr>
+                </a:tc>
+                <a:extLst>
+                  <a:ext uri="{0D108BD9-81ED-4DB2-BD59-A6C34878D82A}">
+                    <a16:rowId xmlns:a16="http://schemas.microsoft.com/office/drawing/2014/main" val="10001"/>
+                  </a:ext>
+                </a:extLst>
+              </a:tr>
+            </a:tbl>
+          </a:graphicData>
+        </a:graphic>
+      </p:graphicFrame>
+      <p:sp>
+        <p:nvSpPr>
+          <p:cNvPr id="4" name="Content Placeholder 3"/>
+          <p:cNvSpPr>
+            <a:spLocks noGrp="1"/>
+          </p:cNvSpPr>
+          <p:nvPr>
+            <p:ph sz="half" idx="2"/>
+          </p:nvPr>
+        </p:nvSpPr>
+        <p:spPr>
+          <a:xfrm>
+            <a:off x="457200" y="1935162"/>
+            <a:ext cx="8305800" cy="1143000"/>
+          </a:xfrm>
+        </p:spPr>
+        <p:txBody>
+          <a:bodyPr>
+            <a:normAutofit fontScale="62500" lnSpcReduction="20000"/>
+          </a:bodyPr>
+          <a:lstStyle/>
+          <a:p>
+            <a:pPr marL="0" indent="0">
+              <a:buNone/>
+            </a:pPr>
+            <a:r>
+              <a:rPr lang="en-US" b="1" dirty="0"/>
+              <a:t>Evaluate Results: </a:t>
+            </a:r>
+          </a:p>
+          <a:p>
+            <a:pPr marL="0" indent="0">
+              <a:buNone/>
+            </a:pPr>
+            <a:r>
+              <a:rPr lang="en-US" dirty="0"/>
+              <a:t>If the following is </a:t>
+            </a:r>
+            <a:r>
+              <a:rPr lang="en-US" b="1" dirty="0"/>
+              <a:t>TRUE</a:t>
+            </a:r>
+            <a:r>
+              <a:rPr lang="en-US" dirty="0"/>
+              <a:t>, the content </a:t>
+            </a:r>
+            <a:r>
+              <a:rPr lang="en-US" b="1" dirty="0"/>
+              <a:t>PASSES</a:t>
+            </a:r>
+            <a:r>
+              <a:rPr lang="en-US" dirty="0"/>
+              <a:t>:</a:t>
+            </a:r>
+          </a:p>
+          <a:p>
+            <a:pPr marL="514350" lvl="0" indent="-514350">
+              <a:buFont typeface="+mj-lt"/>
+              <a:buAutoNum type="arabicPeriod"/>
+            </a:pPr>
+            <a:r>
+              <a:rPr lang="en-US" dirty="0"/>
+              <a:t>An unexpected change of context is not initiated when an interface component receives focus.</a:t>
+            </a:r>
+          </a:p>
+          <a:p>
+            <a:endParaRPr lang="en-US" dirty="0"/>
+          </a:p>
+        </p:txBody>
+      </p:sp>
+      <p:sp>
+        <p:nvSpPr>
+          <p:cNvPr id="7" name="TextBox 6"/>
+          <p:cNvSpPr txBox="1"/>
+          <p:nvPr/>
+        </p:nvSpPr>
+        <p:spPr>
+          <a:xfrm>
+            <a:off x="456344" y="3105560"/>
+            <a:ext cx="8382856" cy="3447098"/>
+          </a:xfrm>
+          <a:prstGeom prst="rect">
+            <a:avLst/>
+          </a:prstGeom>
+          <a:solidFill>
+            <a:schemeClr val="accent3">
+              <a:lumMod val="40000"/>
+              <a:lumOff val="60000"/>
+            </a:schemeClr>
+          </a:solidFill>
+          <a:ln w="22225">
+            <a:solidFill>
+              <a:schemeClr val="accent3">
+                <a:lumMod val="50000"/>
+              </a:schemeClr>
+            </a:solidFill>
+          </a:ln>
+        </p:spPr>
+        <p:txBody>
+          <a:bodyPr wrap="square" rtlCol="0">
+            <a:spAutoFit/>
+          </a:bodyPr>
+          <a:lstStyle/>
+          <a:p>
+            <a:pPr>
+              <a:spcBef>
+                <a:spcPts val="1200"/>
+              </a:spcBef>
+            </a:pPr>
+            <a:r>
+              <a:rPr lang="en-US" sz="2000" b="1" u="sng" dirty="0"/>
+              <a:t>Definitions</a:t>
+            </a:r>
+          </a:p>
+          <a:p>
+            <a:pPr lvl="0"/>
+            <a:r>
+              <a:rPr lang="en-US" b="1" dirty="0"/>
+              <a:t>Change of Content</a:t>
+            </a:r>
+            <a:r>
+              <a:rPr lang="en-US" dirty="0"/>
+              <a:t>: The page content changes in a way that is expected related to  expanding an outline, revealing/hiding content, or accessing a dynamic menu. </a:t>
+            </a:r>
+          </a:p>
+          <a:p>
+            <a:pPr lvl="0"/>
+            <a:endParaRPr lang="en-US" dirty="0"/>
+          </a:p>
+          <a:p>
+            <a:r>
+              <a:rPr lang="en-US" b="1" dirty="0"/>
+              <a:t>Change of Context</a:t>
+            </a:r>
+            <a:r>
+              <a:rPr lang="en-US" dirty="0"/>
+              <a:t>: There is a major change in content that, if made without user awareness, can disorient users who are not able to view the entire page simultaneously. Examples of a change in context include:</a:t>
+            </a:r>
+          </a:p>
+          <a:p>
+            <a:pPr marL="742950" lvl="1" indent="-285750">
+              <a:buFont typeface="Arial" panose="020B0604020202020204" pitchFamily="34" charset="0"/>
+              <a:buChar char="•"/>
+            </a:pPr>
+            <a:r>
+              <a:rPr lang="en-US" dirty="0"/>
+              <a:t>Opening a new browser window.</a:t>
+            </a:r>
+          </a:p>
+          <a:p>
+            <a:pPr marL="742950" lvl="1" indent="-285750">
+              <a:buFont typeface="Arial" panose="020B0604020202020204" pitchFamily="34" charset="0"/>
+              <a:buChar char="•"/>
+            </a:pPr>
+            <a:r>
+              <a:rPr lang="en-US" dirty="0"/>
+              <a:t>Moving focus to a different component.</a:t>
+            </a:r>
+          </a:p>
+          <a:p>
+            <a:pPr marL="742950" lvl="1" indent="-285750">
+              <a:buFont typeface="Arial" panose="020B0604020202020204" pitchFamily="34" charset="0"/>
+              <a:buChar char="•"/>
+            </a:pPr>
+            <a:r>
+              <a:rPr lang="en-US" dirty="0"/>
+              <a:t>Submitting a form automatically when a component receives focus.</a:t>
+            </a:r>
+          </a:p>
+          <a:p>
+            <a:pPr marL="742950" lvl="1" indent="-285750">
+              <a:buFont typeface="Arial" panose="020B0604020202020204" pitchFamily="34" charset="0"/>
+              <a:buChar char="•"/>
+            </a:pPr>
+            <a:r>
+              <a:rPr lang="en-US" dirty="0"/>
+              <a:t>Going to a new web page or window, or appearing to do so.</a:t>
+            </a:r>
+          </a:p>
+          <a:p>
+            <a:pPr marL="742950" lvl="1" indent="-285750">
+              <a:buFont typeface="Arial" panose="020B0604020202020204" pitchFamily="34" charset="0"/>
+              <a:buChar char="•"/>
+            </a:pPr>
+            <a:r>
+              <a:rPr lang="en-US" dirty="0"/>
+              <a:t>Significantly rearranging the content of the page.</a:t>
+            </a:r>
+          </a:p>
+        </p:txBody>
+      </p:sp>
+    </p:spTree>
+    <p:extLst>
+      <p:ext uri="{BB962C8B-B14F-4D97-AF65-F5344CB8AC3E}">
+        <p14:creationId xmlns:p14="http://schemas.microsoft.com/office/powerpoint/2010/main" val="1448557812"/>
+      </p:ext>
+    </p:extLst>
+  </p:cSld>
+  <p:clrMapOvr>
+    <a:masterClrMapping/>
+  </p:clrMapOvr>
+</p:sld>
+</file>
+
+<file path=ppt/slides/slide11.xml><?xml version="1.0" encoding="utf-8"?>
+<p:sld xmlns:a="http://schemas.openxmlformats.org/drawingml/2006/main" xmlns:r="http://schemas.openxmlformats.org/officeDocument/2006/relationships" xmlns:p="http://schemas.openxmlformats.org/presentationml/2006/main">
+  <p:cSld>
+    <p:spTree>
+      <p:nvGrpSpPr>
+        <p:cNvPr id="1" name=""/>
+        <p:cNvGrpSpPr/>
+        <p:nvPr/>
+      </p:nvGrpSpPr>
+      <p:grpSpPr>
+        <a:xfrm>
+          <a:off x="0" y="0"/>
+          <a:ext cx="0" cy="0"/>
+          <a:chOff x="0" y="0"/>
+          <a:chExt cx="0" cy="0"/>
+        </a:xfrm>
+      </p:grpSpPr>
+      <p:sp>
+        <p:nvSpPr>
+          <p:cNvPr id="2" name="Title 1"/>
+          <p:cNvSpPr>
+            <a:spLocks noGrp="1"/>
+          </p:cNvSpPr>
+          <p:nvPr>
+            <p:ph type="title"/>
+          </p:nvPr>
+        </p:nvSpPr>
+        <p:spPr>
+          <a:xfrm>
+            <a:off x="457200" y="0"/>
+            <a:ext cx="8229600" cy="1143000"/>
+          </a:xfrm>
+        </p:spPr>
+        <p:txBody>
+          <a:bodyPr>
+            <a:normAutofit/>
+          </a:bodyPr>
+          <a:lstStyle/>
+          <a:p>
+            <a:r>
+              <a:rPr lang="en-US" dirty="0"/>
+              <a:t>Tips for Focus Order</a:t>
+            </a:r>
+          </a:p>
+        </p:txBody>
+      </p:sp>
+      <p:sp>
+        <p:nvSpPr>
+          <p:cNvPr id="8" name="Content Placeholder 7"/>
+          <p:cNvSpPr txBox="1">
+            <a:spLocks noGrp="1"/>
+          </p:cNvSpPr>
+          <p:nvPr>
+            <p:ph sz="half" idx="2"/>
+          </p:nvPr>
+        </p:nvSpPr>
+        <p:spPr>
+          <a:xfrm>
+            <a:off x="990600" y="1600200"/>
+            <a:ext cx="7772400" cy="2677656"/>
+          </a:xfrm>
+          <a:prstGeom prst="rect">
+            <a:avLst/>
+          </a:prstGeom>
+          <a:solidFill>
+            <a:schemeClr val="tx2">
+              <a:lumMod val="20000"/>
+              <a:lumOff val="80000"/>
+            </a:schemeClr>
+          </a:solidFill>
+          <a:ln w="22225">
+            <a:solidFill>
+              <a:schemeClr val="tx2">
+                <a:lumMod val="75000"/>
+              </a:schemeClr>
+            </a:solidFill>
+          </a:ln>
+        </p:spPr>
+        <p:txBody>
+          <a:bodyPr wrap="square" rtlCol="0">
+            <a:spAutoFit/>
+          </a:bodyPr>
+          <a:lstStyle/>
+          <a:p>
+            <a:pPr marL="0" indent="0">
+              <a:spcBef>
+                <a:spcPts val="1200"/>
+              </a:spcBef>
+              <a:buNone/>
+            </a:pPr>
+            <a:r>
+              <a:rPr lang="en-US" sz="2000" b="1" u="sng" dirty="0"/>
+              <a:t>Tips</a:t>
+            </a:r>
+          </a:p>
+          <a:p>
+            <a:pPr marL="457200" lvl="0" indent="-457200">
+              <a:buFont typeface="+mj-lt"/>
+              <a:buAutoNum type="arabicPeriod"/>
+            </a:pPr>
+            <a:r>
+              <a:rPr lang="en-US" sz="2000" dirty="0"/>
+              <a:t>Focus on an element should not bring an unexpected change – user needs to select the interface component to initiate the change = a new window is launched, or focus is moved to another interface component. </a:t>
+            </a:r>
+          </a:p>
+          <a:p>
+            <a:pPr marL="457200" lvl="0" indent="-457200">
+              <a:buFont typeface="+mj-lt"/>
+              <a:buAutoNum type="arabicPeriod"/>
+            </a:pPr>
+            <a:r>
+              <a:rPr lang="en-US" sz="2000" dirty="0"/>
+              <a:t>It is key to understand the difference between a change of content and a change in context.  Applying this concept also impacts testing for forms in Topic 5 of the test process. </a:t>
+            </a:r>
+          </a:p>
+        </p:txBody>
+      </p:sp>
+    </p:spTree>
+    <p:extLst>
+      <p:ext uri="{BB962C8B-B14F-4D97-AF65-F5344CB8AC3E}">
+        <p14:creationId xmlns:p14="http://schemas.microsoft.com/office/powerpoint/2010/main" val="3986731837"/>
+      </p:ext>
+    </p:extLst>
+  </p:cSld>
+  <p:clrMapOvr>
+    <a:masterClrMapping/>
+  </p:clrMapOvr>
+</p:sld>
+</file>
+
+<file path=ppt/slides/slide12.xml><?xml version="1.0" encoding="utf-8"?>
+<p:sld xmlns:a="http://schemas.openxmlformats.org/drawingml/2006/main" xmlns:r="http://schemas.openxmlformats.org/officeDocument/2006/relationships" xmlns:p="http://schemas.openxmlformats.org/presentationml/2006/main">
+  <p:cSld>
+    <p:spTree>
+      <p:nvGrpSpPr>
+        <p:cNvPr id="1" name=""/>
+        <p:cNvGrpSpPr/>
+        <p:nvPr/>
+      </p:nvGrpSpPr>
+      <p:grpSpPr>
+        <a:xfrm>
+          <a:off x="0" y="0"/>
+          <a:ext cx="0" cy="0"/>
+          <a:chOff x="0" y="0"/>
+          <a:chExt cx="0" cy="0"/>
+        </a:xfrm>
+      </p:grpSpPr>
+      <p:sp>
+        <p:nvSpPr>
+          <p:cNvPr id="2" name="Title 1"/>
+          <p:cNvSpPr>
+            <a:spLocks noGrp="1"/>
+          </p:cNvSpPr>
+          <p:nvPr>
+            <p:ph type="title"/>
+          </p:nvPr>
+        </p:nvSpPr>
+        <p:spPr>
+          <a:xfrm>
+            <a:off x="457200" y="0"/>
+            <a:ext cx="8229600" cy="1143000"/>
+          </a:xfrm>
+        </p:spPr>
+        <p:txBody>
+          <a:bodyPr/>
+          <a:lstStyle/>
+          <a:p>
+            <a:r>
+              <a:rPr lang="en-US" dirty="0"/>
+              <a:t>4.F 2.4.3-focus-order-meaning</a:t>
+            </a:r>
+          </a:p>
+        </p:txBody>
+      </p:sp>
+      <p:graphicFrame>
+        <p:nvGraphicFramePr>
+          <p:cNvPr id="5" name="Content Placeholder 4"/>
+          <p:cNvGraphicFramePr>
+            <a:graphicFrameLocks noGrp="1"/>
+          </p:cNvGraphicFramePr>
+          <p:nvPr>
+            <p:ph sz="half" idx="1"/>
+            <p:extLst>
+              <p:ext uri="{D42A27DB-BD31-4B8C-83A1-F6EECF244321}">
+                <p14:modId xmlns:p14="http://schemas.microsoft.com/office/powerpoint/2010/main" val="4265428286"/>
+              </p:ext>
+            </p:extLst>
+          </p:nvPr>
+        </p:nvGraphicFramePr>
+        <p:xfrm>
+          <a:off x="457200" y="944562"/>
+          <a:ext cx="8229600" cy="914400"/>
+        </p:xfrm>
+        <a:graphic>
+          <a:graphicData uri="http://schemas.openxmlformats.org/drawingml/2006/table">
+            <a:tbl>
+              <a:tblPr firstRow="1" firstCol="1" bandRow="1">
+                <a:tableStyleId>{5C22544A-7EE6-4342-B048-85BDC9FD1C3A}</a:tableStyleId>
+              </a:tblPr>
+              <a:tblGrid>
+                <a:gridCol w="1600200">
+                  <a:extLst>
+                    <a:ext uri="{9D8B030D-6E8A-4147-A177-3AD203B41FA5}">
+                      <a16:colId xmlns:a16="http://schemas.microsoft.com/office/drawing/2014/main" val="20000"/>
+                    </a:ext>
+                  </a:extLst>
+                </a:gridCol>
+                <a:gridCol w="838200">
+                  <a:extLst>
+                    <a:ext uri="{9D8B030D-6E8A-4147-A177-3AD203B41FA5}">
+                      <a16:colId xmlns:a16="http://schemas.microsoft.com/office/drawing/2014/main" val="20001"/>
+                    </a:ext>
+                  </a:extLst>
+                </a:gridCol>
+                <a:gridCol w="5791200">
+                  <a:extLst>
+                    <a:ext uri="{9D8B030D-6E8A-4147-A177-3AD203B41FA5}">
+                      <a16:colId xmlns:a16="http://schemas.microsoft.com/office/drawing/2014/main" val="20002"/>
+                    </a:ext>
+                  </a:extLst>
+                </a:gridCol>
+              </a:tblGrid>
+              <a:tr h="274320">
+                <a:tc>
+                  <a:txBody>
+                    <a:bodyPr/>
+                    <a:lstStyle/>
+                    <a:p>
+                      <a:pPr marL="0" marR="0">
+                        <a:lnSpc>
+                          <a:spcPct val="107000"/>
+                        </a:lnSpc>
+                        <a:spcBef>
+                          <a:spcPts val="0"/>
+                        </a:spcBef>
+                        <a:spcAft>
+                          <a:spcPts val="0"/>
+                        </a:spcAft>
+                      </a:pPr>
+                      <a:r>
+                        <a:rPr lang="en-US" sz="1600" dirty="0">
+                          <a:effectLst/>
+                        </a:rPr>
+                        <a:t>Test Name</a:t>
+                      </a:r>
+                      <a:endParaRPr lang="en-US" sz="1600" dirty="0">
+                        <a:effectLst/>
+                        <a:latin typeface="Calibri"/>
+                        <a:ea typeface="Calibri"/>
+                        <a:cs typeface="Times New Roman"/>
+                      </a:endParaRPr>
+                    </a:p>
+                  </a:txBody>
+                  <a:tcPr marL="46599" marR="46599" marT="0" marB="0">
+                    <a:lnB w="12700" cap="flat" cmpd="sng" algn="ctr">
+                      <a:solidFill>
+                        <a:schemeClr val="tx1"/>
+                      </a:solidFill>
+                      <a:prstDash val="solid"/>
+                      <a:round/>
+                      <a:headEnd type="none" w="med" len="med"/>
+                      <a:tailEnd type="none" w="med" len="med"/>
+                    </a:lnB>
+                  </a:tcPr>
+                </a:tc>
+                <a:tc>
+                  <a:txBody>
+                    <a:bodyPr/>
+                    <a:lstStyle/>
+                    <a:p>
+                      <a:pPr marL="0" marR="0">
+                        <a:lnSpc>
+                          <a:spcPct val="107000"/>
+                        </a:lnSpc>
+                        <a:spcBef>
+                          <a:spcPts val="0"/>
+                        </a:spcBef>
+                        <a:spcAft>
+                          <a:spcPts val="0"/>
+                        </a:spcAft>
+                      </a:pPr>
+                      <a:r>
+                        <a:rPr lang="en-US" sz="1600">
+                          <a:effectLst/>
+                        </a:rPr>
+                        <a:t>Test ID</a:t>
+                      </a:r>
+                      <a:endParaRPr lang="en-US" sz="1600">
+                        <a:effectLst/>
+                        <a:latin typeface="Calibri"/>
+                        <a:ea typeface="Calibri"/>
+                        <a:cs typeface="Times New Roman"/>
+                      </a:endParaRPr>
+                    </a:p>
+                  </a:txBody>
+                  <a:tcPr marL="46599" marR="46599" marT="0" marB="0">
+                    <a:lnB w="12700" cap="flat" cmpd="sng" algn="ctr">
+                      <a:solidFill>
+                        <a:schemeClr val="tx1"/>
+                      </a:solidFill>
+                      <a:prstDash val="solid"/>
+                      <a:round/>
+                      <a:headEnd type="none" w="med" len="med"/>
+                      <a:tailEnd type="none" w="med" len="med"/>
+                    </a:lnB>
+                  </a:tcPr>
+                </a:tc>
+                <a:tc>
+                  <a:txBody>
+                    <a:bodyPr/>
+                    <a:lstStyle/>
+                    <a:p>
+                      <a:pPr marL="0" marR="0">
+                        <a:lnSpc>
+                          <a:spcPct val="107000"/>
+                        </a:lnSpc>
+                        <a:spcBef>
+                          <a:spcPts val="0"/>
+                        </a:spcBef>
+                        <a:spcAft>
+                          <a:spcPts val="0"/>
+                        </a:spcAft>
+                      </a:pPr>
+                      <a:r>
+                        <a:rPr lang="en-US" sz="1600">
+                          <a:effectLst/>
+                        </a:rPr>
+                        <a:t>Test Condition </a:t>
+                      </a:r>
+                      <a:endParaRPr lang="en-US" sz="1600">
+                        <a:effectLst/>
+                        <a:latin typeface="Calibri"/>
+                        <a:ea typeface="Calibri"/>
+                        <a:cs typeface="Times New Roman"/>
+                      </a:endParaRPr>
+                    </a:p>
+                  </a:txBody>
+                  <a:tcPr marL="46599" marR="46599" marT="0" marB="0">
+                    <a:lnB w="12700" cap="flat" cmpd="sng" algn="ctr">
+                      <a:solidFill>
+                        <a:schemeClr val="tx1"/>
+                      </a:solidFill>
+                      <a:prstDash val="solid"/>
+                      <a:round/>
+                      <a:headEnd type="none" w="med" len="med"/>
+                      <a:tailEnd type="none" w="med" len="med"/>
+                    </a:lnB>
+                  </a:tcPr>
+                </a:tc>
+                <a:extLst>
+                  <a:ext uri="{0D108BD9-81ED-4DB2-BD59-A6C34878D82A}">
+                    <a16:rowId xmlns:a16="http://schemas.microsoft.com/office/drawing/2014/main" val="10000"/>
+                  </a:ext>
+                </a:extLst>
+              </a:tr>
+              <a:tr h="640080">
+                <a:tc>
+                  <a:txBody>
+                    <a:bodyPr/>
+                    <a:lstStyle/>
+                    <a:p>
+                      <a:pPr marL="0" marR="0">
+                        <a:lnSpc>
+                          <a:spcPct val="107000"/>
+                        </a:lnSpc>
+                        <a:spcBef>
+                          <a:spcPts val="0"/>
+                        </a:spcBef>
+                        <a:spcAft>
+                          <a:spcPts val="0"/>
+                        </a:spcAft>
+                      </a:pPr>
+                      <a:r>
+                        <a:rPr lang="en-US" sz="1600" dirty="0">
                           <a:solidFill>
                             <a:schemeClr val="tx1"/>
                           </a:solidFill>
@@ -4504,7 +5135,7 @@
                         </a:spcAft>
                       </a:pPr>
                       <a:r>
-                        <a:rPr lang="en-US" sz="1600" dirty="0" smtClean="0">
+                        <a:rPr lang="en-US" sz="1600" dirty="0">
                           <a:solidFill>
                             <a:schemeClr val="tx1"/>
                           </a:solidFill>
@@ -4559,7 +5190,7 @@
                         </a:spcAft>
                       </a:pPr>
                       <a:r>
-                        <a:rPr lang="en-US" sz="1600" dirty="0" smtClean="0">
+                        <a:rPr lang="en-US" sz="1600" dirty="0">
                           <a:solidFill>
                             <a:schemeClr val="tx1"/>
                           </a:solidFill>
@@ -4609,6 +5240,11 @@
                     <a:noFill/>
                   </a:tcPr>
                 </a:tc>
+                <a:extLst>
+                  <a:ext uri="{0D108BD9-81ED-4DB2-BD59-A6C34878D82A}">
+                    <a16:rowId xmlns:a16="http://schemas.microsoft.com/office/drawing/2014/main" val="10001"/>
+                  </a:ext>
+                </a:extLst>
               </a:tr>
             </a:tbl>
           </a:graphicData>
@@ -4686,13 +5322,8 @@
             </a:pPr>
             <a:r>
               <a:rPr lang="en-US" dirty="0"/>
-              <a:t>The focus order preserves the operability of the page</a:t>
-            </a:r>
-            <a:r>
-              <a:rPr lang="en-US" dirty="0" smtClean="0"/>
-              <a:t>.</a:t>
-            </a:r>
-            <a:endParaRPr lang="en-US" dirty="0"/>
+              <a:t>The focus order preserves the operability of the page.</a:t>
+            </a:r>
           </a:p>
           <a:p>
             <a:endParaRPr lang="en-US" dirty="0"/>
@@ -4879,7 +5510,7 @@
               <a:buNone/>
             </a:pPr>
             <a:r>
-              <a:rPr lang="en-US" sz="2000" b="1" u="sng" dirty="0" smtClean="0"/>
+              <a:rPr lang="en-US" sz="2000" b="1" u="sng" dirty="0"/>
               <a:t>Notes:</a:t>
             </a:r>
           </a:p>
@@ -4887,27 +5518,7 @@
             <a:pPr lvl="0"/>
             <a:r>
               <a:rPr lang="en-US" sz="2000" dirty="0"/>
-              <a:t>ANDI tab order markup may be slightly different in certain browsers </a:t>
-            </a:r>
-            <a:r>
-              <a:rPr lang="en-US" sz="2000" dirty="0" smtClean="0"/>
-              <a:t>than a keyboard user’s experience. </a:t>
-            </a:r>
-            <a:r>
-              <a:rPr lang="en-US" sz="2000" dirty="0"/>
-              <a:t>Always use </a:t>
-            </a:r>
-            <a:r>
-              <a:rPr lang="en-US" sz="2000" dirty="0" smtClean="0"/>
-              <a:t>results </a:t>
-            </a:r>
-            <a:r>
-              <a:rPr lang="en-US" sz="2000" dirty="0"/>
-              <a:t>from keyboard </a:t>
-            </a:r>
-            <a:r>
-              <a:rPr lang="en-US" sz="2000" dirty="0" smtClean="0"/>
-              <a:t>navigation.</a:t>
+              <a:t>ANDI tab order markup may be slightly different in certain browsers than a keyboard user’s experience. Always use results from keyboard navigation.</a:t>
             </a:r>
           </a:p>
         </p:txBody>
@@ -4952,50 +5563,16 @@
               </a:spcBef>
             </a:pPr>
             <a:r>
-              <a:rPr lang="en-US" sz="2000" b="1" u="sng" dirty="0" smtClean="0"/>
+              <a:rPr lang="en-US" sz="2000" b="1" u="sng" dirty="0"/>
               <a:t>Definition</a:t>
             </a:r>
-            <a:endParaRPr lang="en-US" sz="2000" b="1" u="sng" dirty="0"/>
           </a:p>
           <a:p>
             <a:pPr lvl="0"/>
             <a:r>
-              <a:rPr lang="en-US" dirty="0" smtClean="0"/>
-              <a:t>A modal dialog box (such as a Save As dialog box) requires a user </a:t>
-            </a:r>
-            <a:r>
               <a:rPr lang="en-US" dirty="0"/>
-              <a:t>to </a:t>
-            </a:r>
-            <a:r>
-              <a:rPr lang="en-US" dirty="0" smtClean="0"/>
-              <a:t>interact </a:t>
-            </a:r>
-            <a:r>
-              <a:rPr lang="en-US" dirty="0"/>
-              <a:t>with it before they can go back </a:t>
-            </a:r>
-            <a:r>
-              <a:rPr lang="en-US" dirty="0" smtClean="0"/>
-              <a:t>to the main page. Visual </a:t>
-            </a:r>
-            <a:r>
-              <a:rPr lang="en-US" dirty="0"/>
-              <a:t>focus is expected to remain within </a:t>
-            </a:r>
-            <a:r>
-              <a:rPr lang="en-US" dirty="0" smtClean="0"/>
-              <a:t>a modal </a:t>
-            </a:r>
-            <a:r>
-              <a:rPr lang="en-US" dirty="0"/>
-              <a:t>dialog box until it is closed</a:t>
-            </a:r>
-            <a:r>
-              <a:rPr lang="en-US" dirty="0" smtClean="0"/>
-              <a:t>.</a:t>
-            </a:r>
-            <a:endParaRPr lang="en-US" dirty="0"/>
+              <a:t>A modal dialog box (such as a Save As dialog box) requires a user to interact with it before they can go back to the main page. Visual focus is expected to remain within a modal dialog box until it is closed.</a:t>
+            </a:r>
           </a:p>
         </p:txBody>
       </p:sp>
@@ -5012,7 +5589,7 @@
 </p:sld>
 </file>
 
-<file path=ppt/slides/slide12.xml><?xml version="1.0" encoding="utf-8"?>
+<file path=ppt/slides/slide13.xml><?xml version="1.0" encoding="utf-8"?>
 <p:sld xmlns:a="http://schemas.openxmlformats.org/drawingml/2006/main" xmlns:r="http://schemas.openxmlformats.org/officeDocument/2006/relationships" xmlns:p="http://schemas.openxmlformats.org/presentationml/2006/main">
   <p:cSld>
     <p:spTree>
@@ -5052,14 +5629,9 @@
           <a:lstStyle/>
           <a:p>
             <a:r>
-              <a:rPr lang="en-US" dirty="0" smtClean="0"/>
-              <a:t>Tips on for </a:t>
-            </a:r>
-            <a:r>
-              <a:rPr lang="en-US" dirty="0" smtClean="0"/>
-              <a:t>Focus</a:t>
-            </a:r>
-            <a:endParaRPr lang="en-US" dirty="0"/>
+              <a:rPr lang="en-US" dirty="0"/>
+              <a:t>Tips on for Focus</a:t>
+            </a:r>
           </a:p>
         </p:txBody>
       </p:sp>
@@ -5108,10 +5680,9 @@
               <a:buNone/>
             </a:pPr>
             <a:r>
-              <a:rPr lang="en-US" sz="2000" b="1" u="sng" dirty="0" smtClean="0"/>
+              <a:rPr lang="en-US" sz="2000" b="1" u="sng" dirty="0"/>
               <a:t>Tips</a:t>
             </a:r>
-            <a:endParaRPr lang="en-US" sz="2000" b="1" u="sng" dirty="0"/>
           </a:p>
           <a:p>
             <a:pPr marL="457200" lvl="0" indent="-457200">
@@ -5120,13 +5691,8 @@
             </a:pPr>
             <a:r>
               <a:rPr lang="en-US" sz="2000" dirty="0"/>
-              <a:t>Failures are most noticeable when focus order does not follow the logical order of operation (normally top to bottom, left to right</a:t>
-            </a:r>
-            <a:r>
-              <a:rPr lang="en-US" sz="2000" dirty="0" smtClean="0"/>
-              <a:t>).</a:t>
-            </a:r>
-            <a:endParaRPr lang="en-US" sz="2000" dirty="0"/>
+              <a:t>Failures are most noticeable when focus order does not follow the logical order of operation (normally top to bottom, left to right).</a:t>
+            </a:r>
           </a:p>
           <a:p>
             <a:pPr marL="457200" lvl="0" indent="-457200">
@@ -5148,7 +5714,6 @@
               <a:rPr lang="en-US" sz="2000" dirty="0"/>
               <a:t>if the specific order does not matter </a:t>
             </a:r>
-            <a:endParaRPr lang="en-US" sz="2000" dirty="0" smtClean="0"/>
           </a:p>
         </p:txBody>
       </p:sp>
@@ -5225,32 +5790,25 @@
           <a:p>
             <a:pPr algn="ctr"/>
             <a:r>
-              <a:rPr lang="en-US" dirty="0" smtClean="0">
+              <a:rPr lang="en-US" dirty="0">
                 <a:hlinkClick r:id="rId3"/>
               </a:rPr>
-              <a:t>https://</a:t>
-            </a:r>
-            <a:r>
-              <a:rPr lang="en-US" dirty="0" smtClean="0">
-                <a:hlinkClick r:id="rId3"/>
-              </a:rPr>
-              <a:t>www.nps.gov/grca/index.htm</a:t>
-            </a:r>
-            <a:r>
-              <a:rPr lang="en-US" dirty="0" smtClean="0"/>
+              <a:t>https://www.nps.gov/grca/index.htm</a:t>
+            </a:r>
+            <a:r>
+              <a:rPr lang="en-US" dirty="0"/>
               <a:t> </a:t>
             </a:r>
           </a:p>
           <a:p>
             <a:pPr algn="ctr"/>
-            <a:endParaRPr lang="en-US" dirty="0" smtClean="0"/>
-          </a:p>
-          <a:p>
-            <a:r>
-              <a:rPr lang="en-US" dirty="0" smtClean="0"/>
+            <a:endParaRPr lang="en-US" dirty="0"/>
+          </a:p>
+          <a:p>
+            <a:r>
+              <a:rPr lang="en-US" dirty="0"/>
               <a:t>In the course, you will mark the last item that received the expected focus.</a:t>
             </a:r>
-            <a:endParaRPr lang="en-US" dirty="0" smtClean="0"/>
           </a:p>
         </p:txBody>
       </p:sp>
@@ -5277,7 +5835,7 @@
           <a:lstStyle/>
           <a:p>
             <a:r>
-              <a:rPr lang="en-US" dirty="0" smtClean="0"/>
+              <a:rPr lang="en-US" dirty="0"/>
               <a:t>Focus order issues can cause users to become lost:</a:t>
             </a:r>
           </a:p>
@@ -5302,7 +5860,7 @@
 </p:sld>
 </file>
 
-<file path=ppt/slides/slide13.xml><?xml version="1.0" encoding="utf-8"?>
+<file path=ppt/slides/slide14.xml><?xml version="1.0" encoding="utf-8"?>
 <p:sld xmlns:a="http://schemas.openxmlformats.org/drawingml/2006/main" xmlns:r="http://schemas.openxmlformats.org/officeDocument/2006/relationships" xmlns:p="http://schemas.openxmlformats.org/presentationml/2006/main">
   <p:cSld>
     <p:spTree>
@@ -5340,10 +5898,9 @@
           <a:lstStyle/>
           <a:p>
             <a:r>
-              <a:rPr lang="en-US" dirty="0" smtClean="0"/>
+              <a:rPr lang="en-US" dirty="0"/>
               <a:t>4.H 2.4.3-focus-order-return</a:t>
             </a:r>
-            <a:endParaRPr lang="en-US" dirty="0"/>
           </a:p>
         </p:txBody>
       </p:sp>
@@ -5373,9 +5930,27 @@
                 <a:tableStyleId>{5C22544A-7EE6-4342-B048-85BDC9FD1C3A}</a:tableStyleId>
               </a:tblPr>
               <a:tblGrid>
-                <a:gridCol w="1600200"/>
-                <a:gridCol w="838200"/>
-                <a:gridCol w="5791200"/>
+                <a:gridCol w="1600200">
+                  <a:extLst>
+                    <a:ext uri="{9D8B030D-6E8A-4147-A177-3AD203B41FA5}">
+                      <a16:colId xmlns:a16="http://schemas.microsoft.com/office/drawing/2014/main" val="20000"/>
+                    </a:ext>
+                  </a:extLst>
+                </a:gridCol>
+                <a:gridCol w="838200">
+                  <a:extLst>
+                    <a:ext uri="{9D8B030D-6E8A-4147-A177-3AD203B41FA5}">
+                      <a16:colId xmlns:a16="http://schemas.microsoft.com/office/drawing/2014/main" val="20001"/>
+                    </a:ext>
+                  </a:extLst>
+                </a:gridCol>
+                <a:gridCol w="5791200">
+                  <a:extLst>
+                    <a:ext uri="{9D8B030D-6E8A-4147-A177-3AD203B41FA5}">
+                      <a16:colId xmlns:a16="http://schemas.microsoft.com/office/drawing/2014/main" val="20002"/>
+                    </a:ext>
+                  </a:extLst>
+                </a:gridCol>
               </a:tblGrid>
               <a:tr h="274320">
                 <a:tc>
@@ -5504,6 +6079,11 @@
                     </a:lnB>
                   </a:tcPr>
                 </a:tc>
+                <a:extLst>
+                  <a:ext uri="{0D108BD9-81ED-4DB2-BD59-A6C34878D82A}">
+                    <a16:rowId xmlns:a16="http://schemas.microsoft.com/office/drawing/2014/main" val="10000"/>
+                  </a:ext>
+                </a:extLst>
               </a:tr>
               <a:tr h="640080">
                 <a:tc>
@@ -5523,7 +6103,7 @@
                         </a:spcAft>
                       </a:pPr>
                       <a:r>
-                        <a:rPr lang="en-US" sz="1600" dirty="0" smtClean="0">
+                        <a:rPr lang="en-US" sz="1600" dirty="0">
                           <a:solidFill>
                             <a:schemeClr val="tx1"/>
                           </a:solidFill>
@@ -5590,7 +6170,7 @@
                         </a:spcAft>
                       </a:pPr>
                       <a:r>
-                        <a:rPr lang="en-US" sz="1600" dirty="0" smtClean="0">
+                        <a:rPr lang="en-US" sz="1600" dirty="0">
                           <a:solidFill>
                             <a:schemeClr val="tx1"/>
                           </a:solidFill>
@@ -5645,7 +6225,7 @@
                         </a:spcAft>
                       </a:pPr>
                       <a:r>
-                        <a:rPr lang="en-US" sz="1600" dirty="0" smtClean="0">
+                        <a:rPr lang="en-US" sz="1600" dirty="0">
                           <a:solidFill>
                             <a:schemeClr val="tx1"/>
                           </a:solidFill>
@@ -5695,6 +6275,11 @@
                     <a:noFill/>
                   </a:tcPr>
                 </a:tc>
+                <a:extLst>
+                  <a:ext uri="{0D108BD9-81ED-4DB2-BD59-A6C34878D82A}">
+                    <a16:rowId xmlns:a16="http://schemas.microsoft.com/office/drawing/2014/main" val="10001"/>
+                  </a:ext>
+                </a:extLst>
               </a:tr>
             </a:tbl>
           </a:graphicData>
@@ -5736,15 +6321,7 @@
             </a:pPr>
             <a:r>
               <a:rPr lang="en-US" dirty="0"/>
-              <a:t>If </a:t>
-            </a:r>
-            <a:r>
-              <a:rPr lang="en-US" dirty="0" smtClean="0"/>
-              <a:t>any the </a:t>
-            </a:r>
-            <a:r>
-              <a:rPr lang="en-US" dirty="0"/>
-              <a:t>following is </a:t>
+              <a:t>If any the following is </a:t>
             </a:r>
             <a:r>
               <a:rPr lang="en-US" b="1" dirty="0"/>
@@ -5782,16 +6359,9 @@
                 <a:ea typeface="Calibri"/>
                 <a:cs typeface="Calibri"/>
               </a:rPr>
-              <a:t>Keyboard focus automatically returns to the logical sequence of focus order before the content was revealed, </a:t>
-            </a:r>
-            <a:r>
-              <a:rPr lang="en-US" dirty="0" smtClean="0">
-                <a:ea typeface="Calibri"/>
-                <a:cs typeface="Calibri"/>
-              </a:rPr>
-              <a:t>OR</a:t>
-            </a:r>
-            <a:endParaRPr lang="en-US" dirty="0" smtClean="0">
+              <a:t>Keyboard focus automatically returns to the logical sequence of focus order before the content was revealed, OR</a:t>
+            </a:r>
+            <a:endParaRPr lang="en-US" dirty="0">
               <a:ea typeface="Calibri"/>
               <a:cs typeface="Times New Roman"/>
             </a:endParaRPr>
@@ -5811,18 +6381,11 @@
               <a:buAutoNum type="arabicPeriod"/>
             </a:pPr>
             <a:r>
-              <a:rPr lang="en-US" dirty="0" smtClean="0">
-                <a:ea typeface="Calibri"/>
-                <a:cs typeface="Calibri"/>
-              </a:rPr>
-              <a:t>One </a:t>
-            </a:r>
-            <a:r>
               <a:rPr lang="en-US" dirty="0">
                 <a:ea typeface="Calibri"/>
                 <a:cs typeface="Calibri"/>
               </a:rPr>
-              <a:t>additional keystroke or keystroke combination returns focus to the logical sequence of focus order before the content was revealed</a:t>
+              <a:t>One additional keystroke or keystroke combination returns focus to the logical sequence of focus order before the content was revealed</a:t>
             </a:r>
             <a:endParaRPr lang="en-US" dirty="0"/>
           </a:p>
@@ -6008,36 +6571,23 @@
               <a:buNone/>
             </a:pPr>
             <a:r>
-              <a:rPr lang="en-US" sz="2000" b="1" u="sng" dirty="0" smtClean="0"/>
+              <a:rPr lang="en-US" sz="2000" b="1" u="sng" dirty="0"/>
               <a:t>Tips:</a:t>
             </a:r>
           </a:p>
           <a:p>
             <a:pPr lvl="0"/>
             <a:r>
-              <a:rPr lang="en-US" sz="2000" dirty="0" smtClean="0"/>
-              <a:t>It </a:t>
-            </a:r>
-            <a:r>
               <a:rPr lang="en-US" sz="2000" dirty="0"/>
-              <a:t>may be necessary to Press the SHIFT + TAB keys or an arrow key to move focus backwards.</a:t>
+              <a:t>It may be necessary to Press the SHIFT + TAB keys or an arrow key to move focus backwards.</a:t>
             </a:r>
           </a:p>
           <a:p>
             <a:pPr lvl="0"/>
             <a:r>
-              <a:rPr lang="en-US" sz="2000" dirty="0" smtClean="0"/>
-              <a:t>One </a:t>
-            </a:r>
-            <a:r>
               <a:rPr lang="en-US" sz="2000" dirty="0"/>
-              <a:t>additional keystroke is allowed to achieve </a:t>
-            </a:r>
-            <a:r>
-              <a:rPr lang="en-US" sz="2000" dirty="0" smtClean="0"/>
-              <a:t>the expected return of focus.</a:t>
-            </a:r>
-            <a:endParaRPr lang="en-US" sz="2000" dirty="0"/>
+              <a:t>One additional keystroke is allowed to achieve the expected return of focus.</a:t>
+            </a:r>
           </a:p>
         </p:txBody>
       </p:sp>
@@ -6045,96 +6595,6 @@
     <p:extLst>
       <p:ext uri="{BB962C8B-B14F-4D97-AF65-F5344CB8AC3E}">
         <p14:creationId xmlns:p14="http://schemas.microsoft.com/office/powerpoint/2010/main" val="1533158244"/>
-      </p:ext>
-    </p:extLst>
-  </p:cSld>
-  <p:clrMapOvr>
-    <a:masterClrMapping/>
-  </p:clrMapOvr>
-</p:sld>
-</file>
-
-<file path=ppt/slides/slide14.xml><?xml version="1.0" encoding="utf-8"?>
-<p:sld xmlns:a="http://schemas.openxmlformats.org/drawingml/2006/main" xmlns:r="http://schemas.openxmlformats.org/officeDocument/2006/relationships" xmlns:p="http://schemas.openxmlformats.org/presentationml/2006/main">
-  <p:cSld>
-    <p:spTree>
-      <p:nvGrpSpPr>
-        <p:cNvPr id="1" name=""/>
-        <p:cNvGrpSpPr/>
-        <p:nvPr/>
-      </p:nvGrpSpPr>
-      <p:grpSpPr>
-        <a:xfrm>
-          <a:off x="0" y="0"/>
-          <a:ext cx="0" cy="0"/>
-          <a:chOff x="0" y="0"/>
-          <a:chExt cx="0" cy="0"/>
-        </a:xfrm>
-      </p:grpSpPr>
-      <p:sp>
-        <p:nvSpPr>
-          <p:cNvPr id="2" name="Title 1"/>
-          <p:cNvSpPr>
-            <a:spLocks noGrp="1"/>
-          </p:cNvSpPr>
-          <p:nvPr>
-            <p:ph type="title"/>
-          </p:nvPr>
-        </p:nvSpPr>
-        <p:spPr/>
-        <p:txBody>
-          <a:bodyPr/>
-          <a:lstStyle/>
-          <a:p>
-            <a:r>
-              <a:rPr lang="en-US" dirty="0" smtClean="0"/>
-              <a:t>Content Structure</a:t>
-            </a:r>
-            <a:endParaRPr lang="en-US" dirty="0"/>
-          </a:p>
-        </p:txBody>
-      </p:sp>
-      <p:sp>
-        <p:nvSpPr>
-          <p:cNvPr id="3" name="Text Placeholder 2"/>
-          <p:cNvSpPr>
-            <a:spLocks noGrp="1"/>
-          </p:cNvSpPr>
-          <p:nvPr>
-            <p:ph type="body" idx="1"/>
-          </p:nvPr>
-        </p:nvSpPr>
-        <p:spPr/>
-        <p:txBody>
-          <a:bodyPr>
-            <a:normAutofit/>
-          </a:bodyPr>
-          <a:lstStyle/>
-          <a:p>
-            <a:r>
-              <a:rPr lang="en-US" sz="4800" dirty="0" smtClean="0">
-                <a:solidFill>
-                  <a:schemeClr val="accent5">
-                    <a:lumMod val="50000"/>
-                  </a:schemeClr>
-                </a:solidFill>
-              </a:rPr>
-              <a:t>Topic 10</a:t>
-            </a:r>
-            <a:endParaRPr lang="en-US" sz="4800" dirty="0">
-              <a:solidFill>
-                <a:schemeClr val="accent5">
-                  <a:lumMod val="50000"/>
-                </a:schemeClr>
-              </a:solidFill>
-            </a:endParaRPr>
-          </a:p>
-        </p:txBody>
-      </p:sp>
-    </p:spTree>
-    <p:extLst>
-      <p:ext uri="{BB962C8B-B14F-4D97-AF65-F5344CB8AC3E}">
-        <p14:creationId xmlns:p14="http://schemas.microsoft.com/office/powerpoint/2010/main" val="2560757471"/>
       </p:ext>
     </p:extLst>
   </p:cSld>
@@ -6171,6 +6631,88 @@
             <p:ph type="title"/>
           </p:nvPr>
         </p:nvSpPr>
+        <p:spPr/>
+        <p:txBody>
+          <a:bodyPr/>
+          <a:lstStyle/>
+          <a:p>
+            <a:r>
+              <a:rPr lang="en-US" dirty="0"/>
+              <a:t>Content Structure</a:t>
+            </a:r>
+          </a:p>
+        </p:txBody>
+      </p:sp>
+      <p:sp>
+        <p:nvSpPr>
+          <p:cNvPr id="3" name="Text Placeholder 2"/>
+          <p:cNvSpPr>
+            <a:spLocks noGrp="1"/>
+          </p:cNvSpPr>
+          <p:nvPr>
+            <p:ph type="body" idx="1"/>
+          </p:nvPr>
+        </p:nvSpPr>
+        <p:spPr/>
+        <p:txBody>
+          <a:bodyPr>
+            <a:normAutofit/>
+          </a:bodyPr>
+          <a:lstStyle/>
+          <a:p>
+            <a:r>
+              <a:rPr lang="en-US" sz="4800" dirty="0">
+                <a:solidFill>
+                  <a:schemeClr val="accent5">
+                    <a:lumMod val="50000"/>
+                  </a:schemeClr>
+                </a:solidFill>
+              </a:rPr>
+              <a:t>Topic 10</a:t>
+            </a:r>
+          </a:p>
+        </p:txBody>
+      </p:sp>
+    </p:spTree>
+    <p:extLst>
+      <p:ext uri="{BB962C8B-B14F-4D97-AF65-F5344CB8AC3E}">
+        <p14:creationId xmlns:p14="http://schemas.microsoft.com/office/powerpoint/2010/main" val="2560757471"/>
+      </p:ext>
+    </p:extLst>
+  </p:cSld>
+  <p:clrMapOvr>
+    <a:masterClrMapping/>
+  </p:clrMapOvr>
+</p:sld>
+</file>
+
+<file path=ppt/slides/slide16.xml><?xml version="1.0" encoding="utf-8"?>
+<p:sld xmlns:a="http://schemas.openxmlformats.org/drawingml/2006/main" xmlns:r="http://schemas.openxmlformats.org/officeDocument/2006/relationships" xmlns:p="http://schemas.openxmlformats.org/presentationml/2006/main">
+  <p:cSld>
+    <p:spTree>
+      <p:nvGrpSpPr>
+        <p:cNvPr id="1" name=""/>
+        <p:cNvGrpSpPr/>
+        <p:nvPr/>
+      </p:nvGrpSpPr>
+      <p:grpSpPr>
+        <a:xfrm>
+          <a:off x="0" y="0"/>
+          <a:ext cx="0" cy="0"/>
+          <a:chOff x="0" y="0"/>
+          <a:chExt cx="0" cy="0"/>
+        </a:xfrm>
+      </p:grpSpPr>
+      <p:sp>
+        <p:nvSpPr>
+          <p:cNvPr id="2" name="Title 1"/>
+          <p:cNvSpPr>
+            <a:spLocks noGrp="1"/>
+          </p:cNvSpPr>
+          <p:nvPr>
+            <p:ph type="title"/>
+          </p:nvPr>
+        </p:nvSpPr>
         <p:spPr>
           <a:xfrm>
             <a:off x="457200" y="0"/>
@@ -6182,10 +6724,9 @@
           <a:lstStyle/>
           <a:p>
             <a:r>
-              <a:rPr lang="en-US" dirty="0" smtClean="0"/>
+              <a:rPr lang="en-US" dirty="0"/>
               <a:t>10.A 2.4.6-heading-purpose</a:t>
             </a:r>
-            <a:endParaRPr lang="en-US" dirty="0"/>
           </a:p>
         </p:txBody>
       </p:sp>
@@ -6215,9 +6756,27 @@
                 <a:tableStyleId>{5C22544A-7EE6-4342-B048-85BDC9FD1C3A}</a:tableStyleId>
               </a:tblPr>
               <a:tblGrid>
-                <a:gridCol w="1600200"/>
-                <a:gridCol w="914400"/>
-                <a:gridCol w="5715000"/>
+                <a:gridCol w="1600200">
+                  <a:extLst>
+                    <a:ext uri="{9D8B030D-6E8A-4147-A177-3AD203B41FA5}">
+                      <a16:colId xmlns:a16="http://schemas.microsoft.com/office/drawing/2014/main" val="20000"/>
+                    </a:ext>
+                  </a:extLst>
+                </a:gridCol>
+                <a:gridCol w="914400">
+                  <a:extLst>
+                    <a:ext uri="{9D8B030D-6E8A-4147-A177-3AD203B41FA5}">
+                      <a16:colId xmlns:a16="http://schemas.microsoft.com/office/drawing/2014/main" val="20001"/>
+                    </a:ext>
+                  </a:extLst>
+                </a:gridCol>
+                <a:gridCol w="5715000">
+                  <a:extLst>
+                    <a:ext uri="{9D8B030D-6E8A-4147-A177-3AD203B41FA5}">
+                      <a16:colId xmlns:a16="http://schemas.microsoft.com/office/drawing/2014/main" val="20002"/>
+                    </a:ext>
+                  </a:extLst>
+                </a:gridCol>
               </a:tblGrid>
               <a:tr h="274320">
                 <a:tc>
@@ -6346,6 +6905,11 @@
                     </a:lnB>
                   </a:tcPr>
                 </a:tc>
+                <a:extLst>
+                  <a:ext uri="{0D108BD9-81ED-4DB2-BD59-A6C34878D82A}">
+                    <a16:rowId xmlns:a16="http://schemas.microsoft.com/office/drawing/2014/main" val="10000"/>
+                  </a:ext>
+                </a:extLst>
               </a:tr>
               <a:tr h="640080">
                 <a:tc>
@@ -6365,7 +6929,7 @@
                         </a:spcAft>
                       </a:pPr>
                       <a:r>
-                        <a:rPr lang="en-US" sz="1600" dirty="0" smtClean="0">
+                        <a:rPr lang="en-US" sz="1600" dirty="0">
                           <a:solidFill>
                             <a:schemeClr val="tx1"/>
                           </a:solidFill>
@@ -6432,7 +6996,7 @@
                         </a:spcAft>
                       </a:pPr>
                       <a:r>
-                        <a:rPr lang="en-US" sz="1600" dirty="0" smtClean="0">
+                        <a:rPr lang="en-US" sz="1600" dirty="0">
                           <a:solidFill>
                             <a:schemeClr val="tx1"/>
                           </a:solidFill>
@@ -6490,7 +7054,7 @@
                         </a:spcAft>
                       </a:pPr>
                       <a:r>
-                        <a:rPr lang="en-US" sz="1600" dirty="0" smtClean="0">
+                        <a:rPr lang="en-US" sz="1600" dirty="0">
                           <a:solidFill>
                             <a:schemeClr val="tx1"/>
                           </a:solidFill>
@@ -6540,6 +7104,11 @@
                     <a:noFill/>
                   </a:tcPr>
                 </a:tc>
+                <a:extLst>
+                  <a:ext uri="{0D108BD9-81ED-4DB2-BD59-A6C34878D82A}">
+                    <a16:rowId xmlns:a16="http://schemas.microsoft.com/office/drawing/2014/main" val="10001"/>
+                  </a:ext>
+                </a:extLst>
               </a:tr>
             </a:tbl>
           </a:graphicData>
@@ -6581,15 +7150,7 @@
             </a:pPr>
             <a:r>
               <a:rPr lang="en-US" sz="1800" dirty="0"/>
-              <a:t>If </a:t>
-            </a:r>
-            <a:r>
-              <a:rPr lang="en-US" sz="1800" dirty="0" smtClean="0"/>
-              <a:t>the </a:t>
-            </a:r>
-            <a:r>
-              <a:rPr lang="en-US" sz="1800" dirty="0"/>
-              <a:t>following is </a:t>
+              <a:t>If the following is </a:t>
             </a:r>
             <a:r>
               <a:rPr lang="en-US" sz="1800" b="1" dirty="0"/>
@@ -6615,13 +7176,8 @@
             </a:pPr>
             <a:r>
               <a:rPr lang="en-US" sz="1800" dirty="0"/>
-              <a:t>The heading describes the topic or purpose of its </a:t>
-            </a:r>
-            <a:r>
-              <a:rPr lang="en-US" sz="1800" dirty="0" smtClean="0"/>
-              <a:t>content. </a:t>
-            </a:r>
-            <a:endParaRPr lang="en-US" sz="1800" dirty="0"/>
+              <a:t>The heading describes the topic or purpose of its content. </a:t>
+            </a:r>
           </a:p>
         </p:txBody>
       </p:sp>
@@ -6805,7 +7361,7 @@
               <a:buNone/>
             </a:pPr>
             <a:r>
-              <a:rPr lang="en-US" sz="2000" b="1" u="sng" dirty="0" smtClean="0">
+              <a:rPr lang="en-US" sz="2000" b="1" u="sng" dirty="0">
                 <a:solidFill>
                   <a:prstClr val="black"/>
                 </a:solidFill>
@@ -6815,7 +7371,7 @@
           </a:p>
           <a:p>
             <a:r>
-              <a:rPr lang="en-US" sz="2000" dirty="0" smtClean="0">
+              <a:rPr lang="en-US" sz="2000" dirty="0">
                 <a:solidFill>
                   <a:prstClr val="black"/>
                 </a:solidFill>
@@ -6825,7 +7381,7 @@
           </a:p>
           <a:p>
             <a:r>
-              <a:rPr lang="en-US" sz="2000" dirty="0" smtClean="0">
+              <a:rPr lang="en-US" sz="2000" dirty="0">
                 <a:solidFill>
                   <a:prstClr val="black"/>
                 </a:solidFill>
@@ -6835,18 +7391,13 @@
           </a:p>
           <a:p>
             <a:r>
-              <a:rPr lang="en-US" sz="2000" dirty="0" smtClean="0">
+              <a:rPr lang="en-US" sz="2000" dirty="0">
                 <a:solidFill>
                   <a:prstClr val="black"/>
                 </a:solidFill>
               </a:rPr>
               <a:t>Heading tests divided to meet different WCAG success criteria</a:t>
             </a:r>
-            <a:endParaRPr lang="en-US" sz="2000" dirty="0">
-              <a:solidFill>
-                <a:prstClr val="black"/>
-              </a:solidFill>
-            </a:endParaRPr>
           </a:p>
         </p:txBody>
       </p:sp>
@@ -6863,7 +7414,7 @@
 </p:sld>
 </file>
 
-<file path=ppt/slides/slide16.xml><?xml version="1.0" encoding="utf-8"?>
+<file path=ppt/slides/slide17.xml><?xml version="1.0" encoding="utf-8"?>
 <p:sld xmlns:a="http://schemas.openxmlformats.org/drawingml/2006/main" xmlns:r="http://schemas.openxmlformats.org/officeDocument/2006/relationships" xmlns:p="http://schemas.openxmlformats.org/presentationml/2006/main">
   <p:cSld>
     <p:spTree>
@@ -6904,13 +7455,8 @@
           <a:p>
             <a:r>
               <a:rPr lang="en-US" dirty="0"/>
-              <a:t>10.D </a:t>
-            </a:r>
-            <a:r>
-              <a:rPr lang="en-US" dirty="0" smtClean="0"/>
-              <a:t>1.3.1-list-type</a:t>
-            </a:r>
-            <a:endParaRPr lang="en-US" dirty="0"/>
+              <a:t>10.D 1.3.1-list-type</a:t>
+            </a:r>
           </a:p>
         </p:txBody>
       </p:sp>
@@ -6940,9 +7486,27 @@
                 <a:tableStyleId>{5C22544A-7EE6-4342-B048-85BDC9FD1C3A}</a:tableStyleId>
               </a:tblPr>
               <a:tblGrid>
-                <a:gridCol w="1600200"/>
-                <a:gridCol w="914400"/>
-                <a:gridCol w="5715000"/>
+                <a:gridCol w="1600200">
+                  <a:extLst>
+                    <a:ext uri="{9D8B030D-6E8A-4147-A177-3AD203B41FA5}">
+                      <a16:colId xmlns:a16="http://schemas.microsoft.com/office/drawing/2014/main" val="20000"/>
+                    </a:ext>
+                  </a:extLst>
+                </a:gridCol>
+                <a:gridCol w="914400">
+                  <a:extLst>
+                    <a:ext uri="{9D8B030D-6E8A-4147-A177-3AD203B41FA5}">
+                      <a16:colId xmlns:a16="http://schemas.microsoft.com/office/drawing/2014/main" val="20001"/>
+                    </a:ext>
+                  </a:extLst>
+                </a:gridCol>
+                <a:gridCol w="5715000">
+                  <a:extLst>
+                    <a:ext uri="{9D8B030D-6E8A-4147-A177-3AD203B41FA5}">
+                      <a16:colId xmlns:a16="http://schemas.microsoft.com/office/drawing/2014/main" val="20002"/>
+                    </a:ext>
+                  </a:extLst>
+                </a:gridCol>
               </a:tblGrid>
               <a:tr h="274320">
                 <a:tc>
@@ -7071,6 +7635,11 @@
                     </a:lnB>
                   </a:tcPr>
                 </a:tc>
+                <a:extLst>
+                  <a:ext uri="{0D108BD9-81ED-4DB2-BD59-A6C34878D82A}">
+                    <a16:rowId xmlns:a16="http://schemas.microsoft.com/office/drawing/2014/main" val="10000"/>
+                  </a:ext>
+                </a:extLst>
               </a:tr>
               <a:tr h="640080">
                 <a:tc>
@@ -7090,7 +7659,7 @@
                         </a:spcAft>
                       </a:pPr>
                       <a:r>
-                        <a:rPr lang="en-US" sz="1600" dirty="0" smtClean="0">
+                        <a:rPr lang="en-US" sz="1600" dirty="0">
                           <a:solidFill>
                             <a:schemeClr val="tx1"/>
                           </a:solidFill>
@@ -7157,7 +7726,7 @@
                         </a:spcAft>
                       </a:pPr>
                       <a:r>
-                        <a:rPr lang="en-US" sz="1600" dirty="0" smtClean="0">
+                        <a:rPr lang="en-US" sz="1600" dirty="0">
                           <a:solidFill>
                             <a:schemeClr val="tx1"/>
                           </a:solidFill>
@@ -7215,7 +7784,7 @@
                         </a:spcAft>
                       </a:pPr>
                       <a:r>
-                        <a:rPr lang="en-US" sz="1600" dirty="0" smtClean="0">
+                        <a:rPr lang="en-US" sz="1600" dirty="0">
                           <a:solidFill>
                             <a:schemeClr val="tx1"/>
                           </a:solidFill>
@@ -7265,6 +7834,11 @@
                     <a:noFill/>
                   </a:tcPr>
                 </a:tc>
+                <a:extLst>
+                  <a:ext uri="{0D108BD9-81ED-4DB2-BD59-A6C34878D82A}">
+                    <a16:rowId xmlns:a16="http://schemas.microsoft.com/office/drawing/2014/main" val="10001"/>
+                  </a:ext>
+                </a:extLst>
               </a:tr>
             </a:tbl>
           </a:graphicData>
@@ -7306,35 +7880,15 @@
             </a:pPr>
             <a:r>
               <a:rPr lang="en-US" sz="2000" dirty="0"/>
-              <a:t>If </a:t>
-            </a:r>
-            <a:r>
-              <a:rPr lang="en-US" sz="2000" dirty="0" smtClean="0"/>
-              <a:t>ALL of the </a:t>
+              <a:t>If ALL of the following are </a:t>
+            </a:r>
+            <a:r>
+              <a:rPr lang="en-US" sz="2000" b="1" dirty="0"/>
+              <a:t>TRUE</a:t>
             </a:r>
             <a:r>
               <a:rPr lang="en-US" sz="2000" dirty="0"/>
-              <a:t>following </a:t>
-            </a:r>
-            <a:r>
-              <a:rPr lang="en-US" sz="2000" dirty="0" smtClean="0"/>
-              <a:t>are </a:t>
-            </a:r>
-            <a:r>
-              <a:rPr lang="en-US" sz="2000" b="1" dirty="0" smtClean="0"/>
-              <a:t>TRUE</a:t>
-            </a:r>
-            <a:r>
-              <a:rPr lang="en-US" sz="2000" dirty="0"/>
-              <a:t>, </a:t>
-            </a:r>
-            <a:r>
-              <a:rPr lang="en-US" sz="2000" dirty="0" smtClean="0"/>
-              <a:t>then the </a:t>
-            </a:r>
-            <a:r>
-              <a:rPr lang="en-US" sz="2000" dirty="0"/>
-              <a:t>content </a:t>
+              <a:t>, then the content </a:t>
             </a:r>
             <a:r>
               <a:rPr lang="en-US" sz="2000" b="1" dirty="0"/>
@@ -7351,16 +7905,8 @@
               <a:buAutoNum type="arabicPeriod"/>
             </a:pPr>
             <a:r>
-              <a:rPr lang="en-US" sz="2000" dirty="0" smtClean="0"/>
-              <a:t>All </a:t>
-            </a:r>
-            <a:r>
               <a:rPr lang="en-US" sz="2000" dirty="0"/>
-              <a:t>content that has the visual appearance of a list is defined programmatically as a list, according to the type of </a:t>
-            </a:r>
-            <a:r>
-              <a:rPr lang="en-US" sz="2000" dirty="0" smtClean="0"/>
-              <a:t>list.</a:t>
+              <a:t>All content that has the visual appearance of a list is defined programmatically as a list, according to the type of list.</a:t>
             </a:r>
           </a:p>
           <a:p>
@@ -7379,16 +7925,8 @@
               <a:buAutoNum type="alphaLcPeriod"/>
             </a:pPr>
             <a:r>
-              <a:rPr lang="en-US" sz="1800" dirty="0" smtClean="0"/>
-              <a:t>An </a:t>
-            </a:r>
-            <a:r>
               <a:rPr lang="en-US" sz="1800" dirty="0"/>
-              <a:t>ordered list is marked as an ordered list (ol</a:t>
-            </a:r>
-            <a:r>
-              <a:rPr lang="en-US" sz="1800" dirty="0" smtClean="0"/>
-              <a:t>).</a:t>
+              <a:t>An ordered list is marked as an ordered list (ol).</a:t>
             </a:r>
           </a:p>
           <a:p>
@@ -7397,12 +7935,8 @@
               <a:buAutoNum type="alphaLcPeriod"/>
             </a:pPr>
             <a:r>
-              <a:rPr lang="en-US" sz="1800" dirty="0" smtClean="0"/>
-              <a:t>Terms </a:t>
-            </a:r>
-            <a:r>
               <a:rPr lang="en-US" sz="1800" dirty="0"/>
-              <a:t>and their descriptions that are presented in the form of a list are marked as a description list (dl) </a:t>
+              <a:t>Terms and their descriptions that are presented in the form of a list are marked as a description list (dl) </a:t>
             </a:r>
           </a:p>
           <a:p>
@@ -7420,23 +7954,15 @@
               <a:buAutoNum type="arabicPeriod" startAt="2"/>
             </a:pPr>
             <a:r>
-              <a:rPr lang="en-US" sz="2000" dirty="0" smtClean="0"/>
-              <a:t>All </a:t>
-            </a:r>
-            <a:r>
               <a:rPr lang="en-US" sz="2000" dirty="0"/>
-              <a:t>programmatic list relationships, including nesting and hierarchies, are consistent with the list relationships presented visually</a:t>
-            </a:r>
-            <a:r>
-              <a:rPr lang="en-US" sz="2000" dirty="0" smtClean="0"/>
-              <a:t>.</a:t>
+              <a:t>All programmatic list relationships, including nesting and hierarchies, are consistent with the list relationships presented visually.</a:t>
             </a:r>
           </a:p>
           <a:p>
             <a:pPr marL="0" lvl="0" indent="0">
               <a:buNone/>
             </a:pPr>
-            <a:endParaRPr lang="en-US" sz="2000" dirty="0" smtClean="0">
+            <a:endParaRPr lang="en-US" sz="2000" dirty="0">
               <a:hlinkClick r:id="rId3"/>
             </a:endParaRPr>
           </a:p>
@@ -7445,16 +7971,10 @@
               <a:buNone/>
             </a:pPr>
             <a:r>
-              <a:rPr lang="en-US" sz="2000" dirty="0" smtClean="0">
-                <a:hlinkClick r:id="rId3"/>
-              </a:rPr>
-              <a:t>https</a:t>
-            </a:r>
-            <a:r>
               <a:rPr lang="en-US" sz="2000" dirty="0">
                 <a:hlinkClick r:id="rId3"/>
               </a:rPr>
-              <a:t>://www.w3.org/TR/WCAG20-TECHS/H48.html</a:t>
+              <a:t>https://www.w3.org/TR/WCAG20-TECHS/H48.html</a:t>
             </a:r>
             <a:endParaRPr lang="en-US" sz="2000" dirty="0"/>
           </a:p>
@@ -7506,10 +8026,9 @@
           <a:lstStyle/>
           <a:p>
             <a:r>
-              <a:rPr lang="en-US" dirty="0" smtClean="0"/>
+              <a:rPr lang="en-US" dirty="0"/>
               <a:t>Keyboard access and focus</a:t>
             </a:r>
-            <a:endParaRPr lang="en-US" dirty="0"/>
           </a:p>
         </p:txBody>
       </p:sp>
@@ -7531,7 +8050,7 @@
           <a:lstStyle/>
           <a:p>
             <a:r>
-              <a:rPr lang="en-US" sz="4800" dirty="0" smtClean="0">
+              <a:rPr lang="en-US" sz="4800" dirty="0">
                 <a:solidFill>
                   <a:schemeClr val="accent5">
                     <a:lumMod val="50000"/>
@@ -7540,13 +8059,6 @@
               </a:rPr>
               <a:t>Topic 4</a:t>
             </a:r>
-            <a:endParaRPr lang="en-US" sz="4800" dirty="0">
-              <a:solidFill>
-                <a:schemeClr val="accent5">
-                  <a:lumMod val="50000"/>
-                </a:schemeClr>
-              </a:solidFill>
-            </a:endParaRPr>
           </a:p>
         </p:txBody>
       </p:sp>
@@ -7601,10 +8113,9 @@
           <a:lstStyle/>
           <a:p>
             <a:r>
-              <a:rPr lang="en-US" dirty="0" smtClean="0"/>
+              <a:rPr lang="en-US" dirty="0"/>
               <a:t>Keyboard Testing</a:t>
             </a:r>
-            <a:endParaRPr lang="en-US" dirty="0"/>
           </a:p>
         </p:txBody>
       </p:sp>
@@ -7636,7 +8147,7 @@
               </a:spcAft>
             </a:pPr>
             <a:r>
-              <a:rPr lang="en-US" sz="3200" dirty="0" smtClean="0"/>
+              <a:rPr lang="en-US" sz="3200" dirty="0"/>
               <a:t>Remains a manual test process requiring interactive elements to be keyboard accessible</a:t>
             </a:r>
           </a:p>
@@ -7647,18 +8158,13 @@
               </a:spcAft>
             </a:pPr>
             <a:r>
-              <a:rPr lang="en-US" sz="3200" dirty="0" smtClean="0"/>
-              <a:t>Requires exploration with a mouse to identify interactive </a:t>
-            </a:r>
-            <a:r>
               <a:rPr lang="en-US" sz="3200" dirty="0"/>
-              <a:t>elements (incl. drop-down menus, tool tips, form fields, hidden content, interactive elements) </a:t>
-            </a:r>
-            <a:endParaRPr lang="en-US" sz="3200" dirty="0" smtClean="0"/>
-          </a:p>
-          <a:p>
-            <a:r>
-              <a:rPr lang="en-US" sz="3200" dirty="0" smtClean="0"/>
+              <a:t>Requires exploration with a mouse to identify interactive elements (incl. drop-down menus, tool tips, form fields, hidden content, interactive elements) </a:t>
+            </a:r>
+          </a:p>
+          <a:p>
+            <a:r>
+              <a:rPr lang="en-US" sz="3200" dirty="0"/>
               <a:t>Use of [TAB] and [SHIFT + TAB], arrow keys, [Esc] key and [ENTER] to navigate using the keyboard </a:t>
             </a:r>
           </a:p>
@@ -7666,7 +8172,7 @@
             <a:pPr marL="0" indent="0">
               <a:buNone/>
             </a:pPr>
-            <a:endParaRPr lang="en-US" sz="2900" b="1" dirty="0" smtClean="0"/>
+            <a:endParaRPr lang="en-US" sz="2900" b="1" dirty="0"/>
           </a:p>
         </p:txBody>
       </p:sp>
@@ -7783,10 +8289,9 @@
           <a:lstStyle/>
           <a:p>
             <a:r>
-              <a:rPr lang="en-US" dirty="0" smtClean="0"/>
+              <a:rPr lang="en-US" dirty="0"/>
               <a:t>4.A Code sample</a:t>
             </a:r>
-            <a:endParaRPr lang="en-US" dirty="0"/>
           </a:p>
         </p:txBody>
       </p:sp>
@@ -7812,7 +8317,7 @@
           <a:graphicData uri="http://schemas.openxmlformats.org/presentationml/2006/ole">
             <mc:AlternateContent xmlns:mc="http://schemas.openxmlformats.org/markup-compatibility/2006">
               <mc:Choice xmlns:v="urn:schemas-microsoft-com:vml" Requires="v">
-                <p:oleObj spid="_x0000_s1058" name="Packager Shell Object" showAsIcon="1" r:id="rId3" imgW="696600" imgH="437400" progId="Package">
+                <p:oleObj spid="_x0000_s1062" name="Packager Shell Object" showAsIcon="1" r:id="rId3" imgW="696600" imgH="437400" progId="Package">
                   <p:embed/>
                 </p:oleObj>
               </mc:Choice>
@@ -7869,7 +8374,7 @@
           <a:graphicData uri="http://schemas.openxmlformats.org/presentationml/2006/ole">
             <mc:AlternateContent xmlns:mc="http://schemas.openxmlformats.org/markup-compatibility/2006">
               <mc:Choice xmlns:v="urn:schemas-microsoft-com:vml" Requires="v">
-                <p:oleObj spid="_x0000_s1059" name="Packager Shell Object" showAsIcon="1" r:id="rId5" imgW="806400" imgH="437400" progId="Package">
+                <p:oleObj spid="_x0000_s1063" name="Packager Shell Object" showAsIcon="1" r:id="rId5" imgW="806400" imgH="437400" progId="Package">
                   <p:embed/>
                 </p:oleObj>
               </mc:Choice>
@@ -7957,10 +8462,9 @@
           <a:lstStyle/>
           <a:p>
             <a:r>
-              <a:rPr lang="en-US" dirty="0" smtClean="0"/>
+              <a:rPr lang="en-US" dirty="0"/>
               <a:t>Keyboard Trap Tips</a:t>
             </a:r>
-            <a:endParaRPr lang="en-US" dirty="0"/>
           </a:p>
         </p:txBody>
       </p:sp>
@@ -8009,27 +8513,22 @@
               <a:buNone/>
             </a:pPr>
             <a:r>
-              <a:rPr lang="en-US" sz="2000" b="1" u="sng" dirty="0" smtClean="0"/>
+              <a:rPr lang="en-US" sz="2000" b="1" u="sng" dirty="0"/>
               <a:t>Tips</a:t>
             </a:r>
-            <a:endParaRPr lang="en-US" sz="2000" b="1" u="sng" dirty="0"/>
           </a:p>
           <a:p>
             <a:pPr lvl="0"/>
             <a:r>
-              <a:rPr lang="en-US" sz="2000" dirty="0" smtClean="0"/>
+              <a:rPr lang="en-US" sz="2000" dirty="0"/>
               <a:t>For a trap to exist, it must be present whether you are navigating forward (TAB) or backward (SHIFT + TAB) through the page.</a:t>
             </a:r>
           </a:p>
           <a:p>
             <a:pPr lvl="0"/>
             <a:r>
-              <a:rPr lang="en-US" sz="2000" dirty="0" smtClean="0"/>
-              <a:t>In </a:t>
-            </a:r>
-            <a:r>
               <a:rPr lang="en-US" sz="2000" dirty="0"/>
-              <a:t>case of a keyboard trap, continue to test interactive elements after the trap by using the mouse to bypass the trap or refreshing the page and using the keyboard to navigate backwards through the page.</a:t>
+              <a:t>In case of a keyboard trap, continue to test interactive elements after the trap by using the mouse to bypass the trap or refreshing the page and using the keyboard to navigate backwards through the page.</a:t>
             </a:r>
           </a:p>
           <a:p>
@@ -8064,7 +8563,7 @@
           <a:lstStyle/>
           <a:p>
             <a:r>
-              <a:rPr lang="en-US" dirty="0" smtClean="0"/>
+              <a:rPr lang="en-US" dirty="0"/>
               <a:t>Demo of keyboard trap</a:t>
             </a:r>
           </a:p>
@@ -8130,10 +8629,9 @@
           <a:lstStyle/>
           <a:p>
             <a:r>
-              <a:rPr lang="en-US" dirty="0" smtClean="0"/>
+              <a:rPr lang="en-US" dirty="0"/>
               <a:t>Course Video</a:t>
             </a:r>
-            <a:endParaRPr lang="en-US" dirty="0"/>
           </a:p>
         </p:txBody>
       </p:sp>
@@ -8160,16 +8658,173 @@
           <a:lstStyle/>
           <a:p>
             <a:r>
-              <a:rPr lang="en-US" dirty="0" smtClean="0"/>
+              <a:rPr lang="en-US" dirty="0"/>
               <a:t>Keyboard traps and other keyboard issues are difficult concepts for many students.</a:t>
             </a:r>
           </a:p>
           <a:p>
             <a:r>
-              <a:rPr lang="en-US" dirty="0" smtClean="0"/>
+              <a:rPr lang="en-US" dirty="0"/>
               <a:t>The course provides a video demonstrating the testing of the incremental exam page which can be found in the course resources page</a:t>
             </a:r>
-            <a:endParaRPr lang="en-US" dirty="0"/>
+          </a:p>
+        </p:txBody>
+      </p:sp>
+      <p:pic>
+        <p:nvPicPr>
+          <p:cNvPr id="8" name="Picture 7"/>
+          <p:cNvPicPr>
+            <a:picLocks noChangeAspect="1"/>
+          </p:cNvPicPr>
+          <p:nvPr/>
+        </p:nvPicPr>
+        <p:blipFill rotWithShape="1">
+          <a:blip r:embed="rId2">
+            <a:extLst>
+              <a:ext uri="{28A0092B-C50C-407E-A947-70E740481C1C}">
+                <a14:useLocalDpi xmlns:a14="http://schemas.microsoft.com/office/drawing/2010/main" val="0"/>
+              </a:ext>
+            </a:extLst>
+          </a:blip>
+          <a:srcRect l="26064" t="13310" r="9149" b="13310"/>
+          <a:stretch/>
+        </p:blipFill>
+        <p:spPr>
+          <a:xfrm>
+            <a:off x="3109608" y="2743200"/>
+            <a:ext cx="5924145" cy="3774331"/>
+          </a:xfrm>
+          <a:prstGeom prst="rect">
+            <a:avLst/>
+          </a:prstGeom>
+          <a:ln>
+            <a:solidFill>
+              <a:schemeClr val="tx2">
+                <a:lumMod val="50000"/>
+              </a:schemeClr>
+            </a:solidFill>
+          </a:ln>
+        </p:spPr>
+      </p:pic>
+      <p:pic>
+        <p:nvPicPr>
+          <p:cNvPr id="11" name="Picture 10">
+            <a:extLst>
+              <a:ext uri="{FF2B5EF4-FFF2-40B4-BE49-F238E27FC236}">
+                <a16:creationId xmlns:a16="http://schemas.microsoft.com/office/drawing/2014/main" id="{2DA10C0E-3DBB-4114-B33A-2DE1656FD4EB}"/>
+              </a:ext>
+            </a:extLst>
+          </p:cNvPr>
+          <p:cNvPicPr>
+            <a:picLocks noChangeAspect="1"/>
+          </p:cNvPicPr>
+          <p:nvPr/>
+        </p:nvPicPr>
+        <p:blipFill>
+          <a:blip r:embed="rId3"/>
+          <a:stretch>
+            <a:fillRect/>
+          </a:stretch>
+        </p:blipFill>
+        <p:spPr>
+          <a:xfrm>
+            <a:off x="3103512" y="685800"/>
+            <a:ext cx="5663268" cy="2427115"/>
+          </a:xfrm>
+          <a:prstGeom prst="rect">
+            <a:avLst/>
+          </a:prstGeom>
+        </p:spPr>
+      </p:pic>
+    </p:spTree>
+    <p:extLst>
+      <p:ext uri="{BB962C8B-B14F-4D97-AF65-F5344CB8AC3E}">
+        <p14:creationId xmlns:p14="http://schemas.microsoft.com/office/powerpoint/2010/main" val="3077503447"/>
+      </p:ext>
+    </p:extLst>
+  </p:cSld>
+  <p:clrMapOvr>
+    <a:masterClrMapping/>
+  </p:clrMapOvr>
+</p:sld>
+</file>
+
+<file path=ppt/slides/slide7.xml><?xml version="1.0" encoding="utf-8"?>
+<p:sld xmlns:a="http://schemas.openxmlformats.org/drawingml/2006/main" xmlns:r="http://schemas.openxmlformats.org/officeDocument/2006/relationships" xmlns:p="http://schemas.openxmlformats.org/presentationml/2006/main">
+  <p:cSld>
+    <p:spTree>
+      <p:nvGrpSpPr>
+        <p:cNvPr id="1" name=""/>
+        <p:cNvGrpSpPr/>
+        <p:nvPr/>
+      </p:nvGrpSpPr>
+      <p:grpSpPr>
+        <a:xfrm>
+          <a:off x="0" y="0"/>
+          <a:ext cx="0" cy="0"/>
+          <a:chOff x="0" y="0"/>
+          <a:chExt cx="0" cy="0"/>
+        </a:xfrm>
+      </p:grpSpPr>
+      <p:sp>
+        <p:nvSpPr>
+          <p:cNvPr id="2" name="Title 1"/>
+          <p:cNvSpPr>
+            <a:spLocks noGrp="1"/>
+          </p:cNvSpPr>
+          <p:nvPr>
+            <p:ph type="title"/>
+          </p:nvPr>
+        </p:nvSpPr>
+        <p:spPr>
+          <a:xfrm>
+            <a:off x="457200" y="0"/>
+            <a:ext cx="8229600" cy="762000"/>
+          </a:xfrm>
+        </p:spPr>
+        <p:txBody>
+          <a:bodyPr/>
+          <a:lstStyle/>
+          <a:p>
+            <a:r>
+              <a:rPr lang="en-US" dirty="0"/>
+              <a:t>Course Video</a:t>
+            </a:r>
+          </a:p>
+        </p:txBody>
+      </p:sp>
+      <p:sp>
+        <p:nvSpPr>
+          <p:cNvPr id="3" name="Content Placeholder 2"/>
+          <p:cNvSpPr>
+            <a:spLocks noGrp="1"/>
+          </p:cNvSpPr>
+          <p:nvPr>
+            <p:ph sz="half" idx="1"/>
+          </p:nvPr>
+        </p:nvSpPr>
+        <p:spPr>
+          <a:xfrm>
+            <a:off x="184826" y="860900"/>
+            <a:ext cx="2634574" cy="5463700"/>
+          </a:xfrm>
+        </p:spPr>
+        <p:txBody>
+          <a:bodyPr>
+            <a:normAutofit fontScale="85000" lnSpcReduction="10000"/>
+          </a:bodyPr>
+          <a:lstStyle/>
+          <a:p>
+            <a:r>
+              <a:rPr lang="en-US" dirty="0"/>
+              <a:t>Keyboard traps and other keyboard issues are difficult concepts for many students.</a:t>
+            </a:r>
+          </a:p>
+          <a:p>
+            <a:r>
+              <a:rPr lang="en-US" dirty="0"/>
+              <a:t>The course provides a video demonstrating the testing of the incremental exam page which can be found in the course resources page</a:t>
+            </a:r>
           </a:p>
         </p:txBody>
       </p:sp>
@@ -8240,7 +8895,9 @@
       <p:cxnSp>
         <p:nvCxnSpPr>
           <p:cNvPr id="10" name="Straight Arrow Connector 9"/>
-          <p:cNvCxnSpPr/>
+          <p:cNvCxnSpPr>
+            <a:cxnSpLocks/>
+          </p:cNvCxnSpPr>
           <p:nvPr/>
         </p:nvCxnSpPr>
         <p:spPr>
@@ -8273,10 +8930,40 @@
           </a:fontRef>
         </p:style>
       </p:cxnSp>
+      <p:pic>
+        <p:nvPicPr>
+          <p:cNvPr id="6" name="Picture 5">
+            <a:extLst>
+              <a:ext uri="{FF2B5EF4-FFF2-40B4-BE49-F238E27FC236}">
+                <a16:creationId xmlns:a16="http://schemas.microsoft.com/office/drawing/2014/main" id="{B2DD8306-6E37-4587-BAED-6554ACA93722}"/>
+              </a:ext>
+            </a:extLst>
+          </p:cNvPr>
+          <p:cNvPicPr>
+            <a:picLocks noChangeAspect="1"/>
+          </p:cNvPicPr>
+          <p:nvPr/>
+        </p:nvPicPr>
+        <p:blipFill>
+          <a:blip r:embed="rId4"/>
+          <a:stretch>
+            <a:fillRect/>
+          </a:stretch>
+        </p:blipFill>
+        <p:spPr>
+          <a:xfrm>
+            <a:off x="2657587" y="2607133"/>
+            <a:ext cx="3828825" cy="1643733"/>
+          </a:xfrm>
+          <a:prstGeom prst="rect">
+            <a:avLst/>
+          </a:prstGeom>
+        </p:spPr>
+      </p:pic>
     </p:spTree>
     <p:extLst>
       <p:ext uri="{BB962C8B-B14F-4D97-AF65-F5344CB8AC3E}">
-        <p14:creationId xmlns:p14="http://schemas.microsoft.com/office/powerpoint/2010/main" val="3077503447"/>
+        <p14:creationId xmlns:p14="http://schemas.microsoft.com/office/powerpoint/2010/main" val="82390956"/>
       </p:ext>
     </p:extLst>
   </p:cSld>
@@ -8286,7 +8973,7 @@
 </p:sld>
 </file>
 
-<file path=ppt/slides/slide7.xml><?xml version="1.0" encoding="utf-8"?>
+<file path=ppt/slides/slide8.xml><?xml version="1.0" encoding="utf-8"?>
 <p:sld xmlns:a="http://schemas.openxmlformats.org/drawingml/2006/main" xmlns:r="http://schemas.openxmlformats.org/officeDocument/2006/relationships" xmlns:p="http://schemas.openxmlformats.org/presentationml/2006/main">
   <p:cSld>
     <p:spTree>
@@ -8319,12 +9006,8 @@
           <a:lstStyle/>
           <a:p>
             <a:r>
-              <a:rPr lang="en-US" dirty="0" smtClean="0"/>
-              <a:t>4.D </a:t>
-            </a:r>
-            <a:r>
               <a:rPr lang="en-US" dirty="0"/>
-              <a:t>2.4.7-focus-visible</a:t>
+              <a:t>4.D 2.4.7-focus-visible</a:t>
             </a:r>
           </a:p>
         </p:txBody>
@@ -8346,7 +9029,7 @@
         </p:nvGraphicFramePr>
         <p:xfrm>
           <a:off x="457200" y="1219200"/>
-          <a:ext cx="8229600" cy="847662"/>
+          <a:ext cx="8229600" cy="838200"/>
         </p:xfrm>
         <a:graphic>
           <a:graphicData uri="http://schemas.openxmlformats.org/drawingml/2006/table">
@@ -8355,9 +9038,27 @@
                 <a:tableStyleId>{5C22544A-7EE6-4342-B048-85BDC9FD1C3A}</a:tableStyleId>
               </a:tblPr>
               <a:tblGrid>
-                <a:gridCol w="1183197"/>
-                <a:gridCol w="712558"/>
-                <a:gridCol w="6333845"/>
+                <a:gridCol w="1183197">
+                  <a:extLst>
+                    <a:ext uri="{9D8B030D-6E8A-4147-A177-3AD203B41FA5}">
+                      <a16:colId xmlns:a16="http://schemas.microsoft.com/office/drawing/2014/main" val="20000"/>
+                    </a:ext>
+                  </a:extLst>
+                </a:gridCol>
+                <a:gridCol w="712558">
+                  <a:extLst>
+                    <a:ext uri="{9D8B030D-6E8A-4147-A177-3AD203B41FA5}">
+                      <a16:colId xmlns:a16="http://schemas.microsoft.com/office/drawing/2014/main" val="20001"/>
+                    </a:ext>
+                  </a:extLst>
+                </a:gridCol>
+                <a:gridCol w="6333845">
+                  <a:extLst>
+                    <a:ext uri="{9D8B030D-6E8A-4147-A177-3AD203B41FA5}">
+                      <a16:colId xmlns:a16="http://schemas.microsoft.com/office/drawing/2014/main" val="20002"/>
+                    </a:ext>
+                  </a:extLst>
+                </a:gridCol>
               </a:tblGrid>
               <a:tr h="251460">
                 <a:tc>
@@ -8486,6 +9187,11 @@
                     </a:lnB>
                   </a:tcPr>
                 </a:tc>
+                <a:extLst>
+                  <a:ext uri="{0D108BD9-81ED-4DB2-BD59-A6C34878D82A}">
+                    <a16:rowId xmlns:a16="http://schemas.microsoft.com/office/drawing/2014/main" val="10000"/>
+                  </a:ext>
+                </a:extLst>
               </a:tr>
               <a:tr h="586740">
                 <a:tc>
@@ -8505,7 +9211,7 @@
                         </a:spcAft>
                       </a:pPr>
                       <a:r>
-                        <a:rPr lang="en-US" sz="1600" dirty="0" smtClean="0">
+                        <a:rPr lang="en-US" sz="1600" dirty="0">
                           <a:solidFill>
                             <a:schemeClr val="tx1"/>
                           </a:solidFill>
@@ -8572,7 +9278,7 @@
                         </a:spcAft>
                       </a:pPr>
                       <a:r>
-                        <a:rPr lang="en-US" sz="1600" dirty="0" smtClean="0">
+                        <a:rPr lang="en-US" sz="1600" dirty="0">
                           <a:solidFill>
                             <a:schemeClr val="tx1"/>
                           </a:solidFill>
@@ -8627,7 +9333,7 @@
                         </a:spcAft>
                       </a:pPr>
                       <a:r>
-                        <a:rPr lang="en-US" sz="1600" smtClean="0">
+                        <a:rPr lang="en-US" sz="1600">
                           <a:solidFill>
                             <a:schemeClr val="tx1"/>
                           </a:solidFill>
@@ -8677,6 +9383,11 @@
                     <a:noFill/>
                   </a:tcPr>
                 </a:tc>
+                <a:extLst>
+                  <a:ext uri="{0D108BD9-81ED-4DB2-BD59-A6C34878D82A}">
+                    <a16:rowId xmlns:a16="http://schemas.microsoft.com/office/drawing/2014/main" val="10001"/>
+                  </a:ext>
+                </a:extLst>
               </a:tr>
             </a:tbl>
           </a:graphicData>
@@ -8743,16 +9454,8 @@
               <a:buAutoNum type="arabicPeriod"/>
             </a:pPr>
             <a:r>
-              <a:rPr lang="en-US" dirty="0" smtClean="0"/>
-              <a:t>When </a:t>
-            </a:r>
-            <a:r>
               <a:rPr lang="en-US" dirty="0"/>
-              <a:t>each interface element receives focus, there is a visible indication of focus</a:t>
-            </a:r>
-            <a:r>
-              <a:rPr lang="en-US" dirty="0" smtClean="0"/>
-              <a:t>.</a:t>
+              <a:t>When each interface element receives focus, there is a visible indication of focus.</a:t>
             </a:r>
           </a:p>
           <a:p>
@@ -8800,18 +9503,13 @@
               </a:spcBef>
             </a:pPr>
             <a:r>
-              <a:rPr lang="en-US" sz="2000" b="1" u="sng" dirty="0" smtClean="0">
+              <a:rPr lang="en-US" sz="2000" b="1" u="sng" dirty="0">
                 <a:solidFill>
                   <a:prstClr val="black"/>
                 </a:solidFill>
               </a:rPr>
               <a:t>Tips</a:t>
             </a:r>
-            <a:endParaRPr lang="en-US" sz="2000" b="1" u="sng" dirty="0">
-              <a:solidFill>
-                <a:prstClr val="black"/>
-              </a:solidFill>
-            </a:endParaRPr>
           </a:p>
           <a:p>
             <a:pPr marL="342900" lvl="0" indent="-342900">
@@ -8829,7 +9527,7 @@
               <a:buChar char="•"/>
             </a:pPr>
             <a:r>
-              <a:rPr lang="en-US" sz="2000" dirty="0" smtClean="0">
+              <a:rPr lang="en-US" sz="2000" dirty="0">
                 <a:solidFill>
                   <a:prstClr val="black"/>
                 </a:solidFill>
@@ -8843,7 +9541,7 @@
               <a:buChar char="•"/>
             </a:pPr>
             <a:r>
-              <a:rPr lang="en-US" sz="2000" dirty="0" smtClean="0">
+              <a:rPr lang="en-US" sz="2000" dirty="0">
                 <a:solidFill>
                   <a:prstClr val="black"/>
                 </a:solidFill>
@@ -8857,18 +9555,13 @@
               <a:buChar char="•"/>
             </a:pPr>
             <a:r>
-              <a:rPr lang="en-US" sz="2000" dirty="0" smtClean="0">
+              <a:rPr lang="en-US" sz="2000" dirty="0">
                 <a:solidFill>
                   <a:prstClr val="black"/>
                 </a:solidFill>
               </a:rPr>
               <a:t>Does not apply to elements that do not receive keyboard focus. (Those elements are not failed for both 4.A and 4.D.)</a:t>
             </a:r>
-            <a:endParaRPr lang="en-US" sz="2000" dirty="0">
-              <a:solidFill>
-                <a:prstClr val="black"/>
-              </a:solidFill>
-            </a:endParaRPr>
           </a:p>
           <a:p>
             <a:pPr marL="342900" lvl="0" indent="-342900">
@@ -8877,11 +9570,7 @@
             </a:pPr>
             <a:r>
               <a:rPr lang="en-US" sz="2000" dirty="0"/>
-              <a:t>Focus indicator is not required to be the same – can be outline, change in hue (though not use of color), making font </a:t>
-            </a:r>
-            <a:r>
-              <a:rPr lang="en-US" sz="2000" dirty="0" smtClean="0"/>
-              <a:t>bold. </a:t>
+              <a:t>Focus indicator is not required to be the same – can be outline, change in hue (though not use of color), making font bold. </a:t>
             </a:r>
           </a:p>
         </p:txBody>
@@ -8890,211 +9579,6 @@
     <p:extLst>
       <p:ext uri="{BB962C8B-B14F-4D97-AF65-F5344CB8AC3E}">
         <p14:creationId xmlns:p14="http://schemas.microsoft.com/office/powerpoint/2010/main" val="3238689643"/>
-      </p:ext>
-    </p:extLst>
-  </p:cSld>
-  <p:clrMapOvr>
-    <a:masterClrMapping/>
-  </p:clrMapOvr>
-</p:sld>
-</file>
-
-<file path=ppt/slides/slide8.xml><?xml version="1.0" encoding="utf-8"?>
-<p:sld xmlns:a="http://schemas.openxmlformats.org/drawingml/2006/main" xmlns:r="http://schemas.openxmlformats.org/officeDocument/2006/relationships" xmlns:p="http://schemas.openxmlformats.org/presentationml/2006/main">
-  <p:cSld>
-    <p:spTree>
-      <p:nvGrpSpPr>
-        <p:cNvPr id="1" name=""/>
-        <p:cNvGrpSpPr/>
-        <p:nvPr/>
-      </p:nvGrpSpPr>
-      <p:grpSpPr>
-        <a:xfrm>
-          <a:off x="0" y="0"/>
-          <a:ext cx="0" cy="0"/>
-          <a:chOff x="0" y="0"/>
-          <a:chExt cx="0" cy="0"/>
-        </a:xfrm>
-      </p:grpSpPr>
-      <p:sp>
-        <p:nvSpPr>
-          <p:cNvPr id="2" name="Title 1"/>
-          <p:cNvSpPr>
-            <a:spLocks noGrp="1"/>
-          </p:cNvSpPr>
-          <p:nvPr>
-            <p:ph type="title"/>
-          </p:nvPr>
-        </p:nvSpPr>
-        <p:spPr>
-          <a:xfrm>
-            <a:off x="457200" y="0"/>
-            <a:ext cx="8229600" cy="1143000"/>
-          </a:xfrm>
-        </p:spPr>
-        <p:txBody>
-          <a:bodyPr>
-            <a:normAutofit/>
-          </a:bodyPr>
-          <a:lstStyle/>
-          <a:p>
-            <a:r>
-              <a:rPr lang="en-US" dirty="0" smtClean="0"/>
-              <a:t>Notes for Focus with Frames</a:t>
-            </a:r>
-            <a:endParaRPr lang="en-US" dirty="0"/>
-          </a:p>
-        </p:txBody>
-      </p:sp>
-      <p:sp>
-        <p:nvSpPr>
-          <p:cNvPr id="8" name="Content Placeholder 7"/>
-          <p:cNvSpPr txBox="1">
-            <a:spLocks noGrp="1"/>
-          </p:cNvSpPr>
-          <p:nvPr>
-            <p:ph sz="half" idx="2"/>
-          </p:nvPr>
-        </p:nvSpPr>
-        <p:spPr>
-          <a:xfrm>
-            <a:off x="990600" y="1600200"/>
-            <a:ext cx="7772400" cy="3551742"/>
-          </a:xfrm>
-          <a:prstGeom prst="rect">
-            <a:avLst/>
-          </a:prstGeom>
-          <a:solidFill>
-            <a:schemeClr val="tx2">
-              <a:lumMod val="20000"/>
-              <a:lumOff val="80000"/>
-            </a:schemeClr>
-          </a:solidFill>
-          <a:ln w="22225">
-            <a:solidFill>
-              <a:schemeClr val="tx2">
-                <a:lumMod val="75000"/>
-              </a:schemeClr>
-            </a:solidFill>
-          </a:ln>
-        </p:spPr>
-        <p:txBody>
-          <a:bodyPr wrap="square" rtlCol="0">
-            <a:spAutoFit/>
-          </a:bodyPr>
-          <a:lstStyle/>
-          <a:p>
-            <a:pPr marL="0" indent="0">
-              <a:spcBef>
-                <a:spcPts val="1200"/>
-              </a:spcBef>
-              <a:buNone/>
-            </a:pPr>
-            <a:r>
-              <a:rPr lang="en-US" sz="2000" b="1" u="sng" dirty="0" smtClean="0"/>
-              <a:t>Note</a:t>
-            </a:r>
-            <a:endParaRPr lang="en-US" sz="2000" b="1" u="sng" dirty="0"/>
-          </a:p>
-          <a:p>
-            <a:pPr marL="0" lvl="0" indent="0">
-              <a:buNone/>
-            </a:pPr>
-            <a:r>
-              <a:rPr lang="en-US" sz="2000" dirty="0" smtClean="0"/>
-              <a:t>To </a:t>
-            </a:r>
-            <a:r>
-              <a:rPr lang="en-US" sz="2000" dirty="0"/>
-              <a:t>confirm keyboard focus is on a frame when there is not visible focus: </a:t>
-            </a:r>
-            <a:endParaRPr lang="en-US" sz="2000" dirty="0" smtClean="0"/>
-          </a:p>
-          <a:p>
-            <a:pPr marL="457200" lvl="0" indent="-457200">
-              <a:buFont typeface="+mj-lt"/>
-              <a:buAutoNum type="arabicPeriod"/>
-            </a:pPr>
-            <a:r>
-              <a:rPr lang="en-US" sz="1800" dirty="0" smtClean="0"/>
-              <a:t>Use the TAB and SHIFT + TAB combination </a:t>
-            </a:r>
-            <a:r>
-              <a:rPr lang="en-US" sz="1800" dirty="0"/>
-              <a:t>to deduce that the keyboard focus is on the frame. </a:t>
-            </a:r>
-            <a:endParaRPr lang="en-US" sz="1800" dirty="0" smtClean="0"/>
-          </a:p>
-          <a:p>
-            <a:pPr marL="457200" lvl="0" indent="-457200">
-              <a:buFont typeface="+mj-lt"/>
-              <a:buAutoNum type="arabicPeriod"/>
-            </a:pPr>
-            <a:r>
-              <a:rPr lang="en-US" sz="1800" dirty="0" smtClean="0"/>
-              <a:t>When </a:t>
-            </a:r>
-            <a:r>
-              <a:rPr lang="en-US" sz="1800" dirty="0"/>
-              <a:t>on the frame, a tab forward should move focus to the first keyboard focusable element within the frame. </a:t>
-            </a:r>
-            <a:endParaRPr lang="en-US" sz="1800" dirty="0" smtClean="0"/>
-          </a:p>
-          <a:p>
-            <a:pPr marL="457200" lvl="0" indent="-457200">
-              <a:buFont typeface="+mj-lt"/>
-              <a:buAutoNum type="arabicPeriod"/>
-            </a:pPr>
-            <a:r>
-              <a:rPr lang="en-US" sz="1800" dirty="0" smtClean="0"/>
-              <a:t>From </a:t>
-            </a:r>
-            <a:r>
-              <a:rPr lang="en-US" sz="1800" dirty="0"/>
-              <a:t>there, SHIFT + TAB </a:t>
-            </a:r>
-            <a:r>
-              <a:rPr lang="en-US" sz="1800" dirty="0" smtClean="0"/>
-              <a:t>once </a:t>
-            </a:r>
-            <a:r>
-              <a:rPr lang="en-US" sz="1800" dirty="0"/>
-              <a:t>to move back to the frame and another SHIFT + TAB </a:t>
-            </a:r>
-            <a:r>
-              <a:rPr lang="en-US" sz="1800" dirty="0" smtClean="0"/>
-              <a:t> should </a:t>
-            </a:r>
-            <a:r>
-              <a:rPr lang="en-US" sz="1800" dirty="0"/>
-              <a:t>move focus to a keyboard focusable element before the frame. </a:t>
-            </a:r>
-            <a:endParaRPr lang="en-US" sz="1800" dirty="0" smtClean="0"/>
-          </a:p>
-          <a:p>
-            <a:pPr marL="0" lvl="0" indent="0">
-              <a:buNone/>
-            </a:pPr>
-            <a:r>
-              <a:rPr lang="en-US" sz="2000" dirty="0" smtClean="0"/>
-              <a:t>Only </a:t>
-            </a:r>
-            <a:r>
-              <a:rPr lang="en-US" sz="2000" dirty="0"/>
-              <a:t>the frame is permitted to not have a visible focus. Be certain it is the frame that does not have a visible focus and not another </a:t>
-            </a:r>
-            <a:r>
-              <a:rPr lang="en-US" sz="2000" dirty="0" smtClean="0"/>
-              <a:t>element.</a:t>
-            </a:r>
-            <a:endParaRPr lang="en-US" sz="2000" dirty="0"/>
-          </a:p>
-        </p:txBody>
-      </p:sp>
-    </p:spTree>
-    <p:extLst>
-      <p:ext uri="{BB962C8B-B14F-4D97-AF65-F5344CB8AC3E}">
-        <p14:creationId xmlns:p14="http://schemas.microsoft.com/office/powerpoint/2010/main" val="2442417761"/>
       </p:ext>
     </p:extLst>
   </p:cSld>
@@ -9138,373 +9622,22 @@
           </a:xfrm>
         </p:spPr>
         <p:txBody>
-          <a:bodyPr/>
+          <a:bodyPr>
+            <a:normAutofit/>
+          </a:bodyPr>
           <a:lstStyle/>
           <a:p>
             <a:r>
               <a:rPr lang="en-US" dirty="0"/>
-              <a:t>4.E 3.2.1-on-focus</a:t>
-            </a:r>
-          </a:p>
-        </p:txBody>
-      </p:sp>
-      <p:graphicFrame>
-        <p:nvGraphicFramePr>
-          <p:cNvPr id="5" name="Content Placeholder 4"/>
-          <p:cNvGraphicFramePr>
-            <a:graphicFrameLocks noGrp="1"/>
-          </p:cNvGraphicFramePr>
-          <p:nvPr>
-            <p:ph sz="half" idx="1"/>
-            <p:extLst>
-              <p:ext uri="{D42A27DB-BD31-4B8C-83A1-F6EECF244321}">
-                <p14:modId xmlns:p14="http://schemas.microsoft.com/office/powerpoint/2010/main" val="1532220904"/>
-              </p:ext>
-            </p:extLst>
-          </p:nvPr>
-        </p:nvGraphicFramePr>
-        <p:xfrm>
-          <a:off x="457200" y="944562"/>
-          <a:ext cx="8229600" cy="914400"/>
-        </p:xfrm>
-        <a:graphic>
-          <a:graphicData uri="http://schemas.openxmlformats.org/drawingml/2006/table">
-            <a:tbl>
-              <a:tblPr firstRow="1" firstCol="1" bandRow="1">
-                <a:tableStyleId>{5C22544A-7EE6-4342-B048-85BDC9FD1C3A}</a:tableStyleId>
-              </a:tblPr>
-              <a:tblGrid>
-                <a:gridCol w="1183197"/>
-                <a:gridCol w="712558"/>
-                <a:gridCol w="6333845"/>
-              </a:tblGrid>
-              <a:tr h="274320">
-                <a:tc>
-                  <a:txBody>
-                    <a:bodyPr/>
-                    <a:lstStyle/>
-                    <a:p>
-                      <a:pPr marL="0" marR="0">
-                        <a:lnSpc>
-                          <a:spcPct val="107000"/>
-                        </a:lnSpc>
-                        <a:spcBef>
-                          <a:spcPts val="0"/>
-                        </a:spcBef>
-                        <a:spcAft>
-                          <a:spcPts val="0"/>
-                        </a:spcAft>
-                      </a:pPr>
-                      <a:r>
-                        <a:rPr lang="en-US" sz="1600" dirty="0">
-                          <a:effectLst/>
-                        </a:rPr>
-                        <a:t>Test Name</a:t>
-                      </a:r>
-                      <a:endParaRPr lang="en-US" sz="1600" dirty="0">
-                        <a:effectLst/>
-                        <a:latin typeface="Calibri"/>
-                        <a:ea typeface="Calibri"/>
-                        <a:cs typeface="Times New Roman"/>
-                      </a:endParaRPr>
-                    </a:p>
-                  </a:txBody>
-                  <a:tcPr marL="46599" marR="46599" marT="0" marB="0">
-                    <a:lnB w="12700" cap="flat" cmpd="sng" algn="ctr">
-                      <a:solidFill>
-                        <a:schemeClr val="tx1"/>
-                      </a:solidFill>
-                      <a:prstDash val="solid"/>
-                      <a:round/>
-                      <a:headEnd type="none" w="med" len="med"/>
-                      <a:tailEnd type="none" w="med" len="med"/>
-                    </a:lnB>
-                  </a:tcPr>
-                </a:tc>
-                <a:tc>
-                  <a:txBody>
-                    <a:bodyPr/>
-                    <a:lstStyle/>
-                    <a:p>
-                      <a:pPr marL="0" marR="0">
-                        <a:lnSpc>
-                          <a:spcPct val="107000"/>
-                        </a:lnSpc>
-                        <a:spcBef>
-                          <a:spcPts val="0"/>
-                        </a:spcBef>
-                        <a:spcAft>
-                          <a:spcPts val="0"/>
-                        </a:spcAft>
-                      </a:pPr>
-                      <a:r>
-                        <a:rPr lang="en-US" sz="1600">
-                          <a:effectLst/>
-                        </a:rPr>
-                        <a:t>Test ID</a:t>
-                      </a:r>
-                      <a:endParaRPr lang="en-US" sz="1600">
-                        <a:effectLst/>
-                        <a:latin typeface="Calibri"/>
-                        <a:ea typeface="Calibri"/>
-                        <a:cs typeface="Times New Roman"/>
-                      </a:endParaRPr>
-                    </a:p>
-                  </a:txBody>
-                  <a:tcPr marL="46599" marR="46599" marT="0" marB="0">
-                    <a:lnB w="12700" cap="flat" cmpd="sng" algn="ctr">
-                      <a:solidFill>
-                        <a:schemeClr val="tx1"/>
-                      </a:solidFill>
-                      <a:prstDash val="solid"/>
-                      <a:round/>
-                      <a:headEnd type="none" w="med" len="med"/>
-                      <a:tailEnd type="none" w="med" len="med"/>
-                    </a:lnB>
-                  </a:tcPr>
-                </a:tc>
-                <a:tc>
-                  <a:txBody>
-                    <a:bodyPr/>
-                    <a:lstStyle/>
-                    <a:p>
-                      <a:pPr marL="0" marR="0">
-                        <a:lnSpc>
-                          <a:spcPct val="107000"/>
-                        </a:lnSpc>
-                        <a:spcBef>
-                          <a:spcPts val="0"/>
-                        </a:spcBef>
-                        <a:spcAft>
-                          <a:spcPts val="0"/>
-                        </a:spcAft>
-                      </a:pPr>
-                      <a:r>
-                        <a:rPr lang="en-US" sz="1600">
-                          <a:effectLst/>
-                        </a:rPr>
-                        <a:t>Test Condition </a:t>
-                      </a:r>
-                      <a:endParaRPr lang="en-US" sz="1600">
-                        <a:effectLst/>
-                        <a:latin typeface="Calibri"/>
-                        <a:ea typeface="Calibri"/>
-                        <a:cs typeface="Times New Roman"/>
-                      </a:endParaRPr>
-                    </a:p>
-                  </a:txBody>
-                  <a:tcPr marL="46599" marR="46599" marT="0" marB="0">
-                    <a:lnB w="12700" cap="flat" cmpd="sng" algn="ctr">
-                      <a:solidFill>
-                        <a:schemeClr val="tx1"/>
-                      </a:solidFill>
-                      <a:prstDash val="solid"/>
-                      <a:round/>
-                      <a:headEnd type="none" w="med" len="med"/>
-                      <a:tailEnd type="none" w="med" len="med"/>
-                    </a:lnB>
-                  </a:tcPr>
-                </a:tc>
-              </a:tr>
-              <a:tr h="640080">
-                <a:tc>
-                  <a:txBody>
-                    <a:bodyPr/>
-                    <a:lstStyle/>
-                    <a:p>
-                      <a:pPr marL="0" marR="0">
-                        <a:lnSpc>
-                          <a:spcPct val="107000"/>
-                        </a:lnSpc>
-                        <a:spcBef>
-                          <a:spcPts val="0"/>
-                        </a:spcBef>
-                        <a:spcAft>
-                          <a:spcPts val="0"/>
-                        </a:spcAft>
-                      </a:pPr>
-                      <a:r>
-                        <a:rPr lang="en-US" sz="1600" dirty="0" smtClean="0">
-                          <a:solidFill>
-                            <a:schemeClr val="tx1"/>
-                          </a:solidFill>
-                          <a:effectLst/>
-                        </a:rPr>
-                        <a:t>3.2.1-on-focus</a:t>
-                      </a:r>
-                      <a:endParaRPr lang="en-US" sz="1600" dirty="0">
-                        <a:solidFill>
-                          <a:schemeClr val="tx1"/>
-                        </a:solidFill>
-                        <a:effectLst/>
-                        <a:latin typeface="Calibri"/>
-                        <a:ea typeface="Calibri"/>
-                        <a:cs typeface="Times New Roman"/>
-                      </a:endParaRPr>
-                    </a:p>
-                  </a:txBody>
-                  <a:tcPr marL="46599" marR="46599" marT="0" marB="0">
-                    <a:lnL w="12700" cap="flat" cmpd="sng" algn="ctr">
-                      <a:solidFill>
-                        <a:schemeClr val="tx1"/>
-                      </a:solidFill>
-                      <a:prstDash val="solid"/>
-                      <a:round/>
-                      <a:headEnd type="none" w="med" len="med"/>
-                      <a:tailEnd type="none" w="med" len="med"/>
-                    </a:lnL>
-                    <a:lnT w="12700" cap="flat" cmpd="sng" algn="ctr">
-                      <a:solidFill>
-                        <a:schemeClr val="tx1"/>
-                      </a:solidFill>
-                      <a:prstDash val="solid"/>
-                      <a:round/>
-                      <a:headEnd type="none" w="med" len="med"/>
-                      <a:tailEnd type="none" w="med" len="med"/>
-                    </a:lnT>
-                    <a:lnB w="12700" cap="flat" cmpd="sng" algn="ctr">
-                      <a:solidFill>
-                        <a:schemeClr val="tx1"/>
-                      </a:solidFill>
-                      <a:prstDash val="solid"/>
-                      <a:round/>
-                      <a:headEnd type="none" w="med" len="med"/>
-                      <a:tailEnd type="none" w="med" len="med"/>
-                    </a:lnB>
-                    <a:noFill/>
-                  </a:tcPr>
-                </a:tc>
-                <a:tc>
-                  <a:txBody>
-                    <a:bodyPr/>
-                    <a:lstStyle/>
-                    <a:p>
-                      <a:pPr marL="0" marR="0">
-                        <a:lnSpc>
-                          <a:spcPct val="107000"/>
-                        </a:lnSpc>
-                        <a:spcBef>
-                          <a:spcPts val="0"/>
-                        </a:spcBef>
-                        <a:spcAft>
-                          <a:spcPts val="0"/>
-                        </a:spcAft>
-                      </a:pPr>
-                      <a:r>
-                        <a:rPr lang="en-US" sz="1600" dirty="0" smtClean="0">
-                          <a:solidFill>
-                            <a:schemeClr val="tx1"/>
-                          </a:solidFill>
-                          <a:effectLst/>
-                        </a:rPr>
-                        <a:t>4.E</a:t>
-                      </a:r>
-                      <a:endParaRPr lang="en-US" sz="1600" dirty="0">
-                        <a:solidFill>
-                          <a:schemeClr val="tx1"/>
-                        </a:solidFill>
-                        <a:effectLst/>
-                        <a:latin typeface="Calibri"/>
-                        <a:ea typeface="Calibri"/>
-                        <a:cs typeface="Times New Roman"/>
-                      </a:endParaRPr>
-                    </a:p>
-                  </a:txBody>
-                  <a:tcPr marL="46599" marR="46599" marT="0" marB="0">
-                    <a:lnT w="12700" cap="flat" cmpd="sng" algn="ctr">
-                      <a:solidFill>
-                        <a:schemeClr val="tx1"/>
-                      </a:solidFill>
-                      <a:prstDash val="solid"/>
-                      <a:round/>
-                      <a:headEnd type="none" w="med" len="med"/>
-                      <a:tailEnd type="none" w="med" len="med"/>
-                    </a:lnT>
-                    <a:lnB w="12700" cap="flat" cmpd="sng" algn="ctr">
-                      <a:solidFill>
-                        <a:schemeClr val="tx1"/>
-                      </a:solidFill>
-                      <a:prstDash val="solid"/>
-                      <a:round/>
-                      <a:headEnd type="none" w="med" len="med"/>
-                      <a:tailEnd type="none" w="med" len="med"/>
-                    </a:lnB>
-                    <a:noFill/>
-                  </a:tcPr>
-                </a:tc>
-                <a:tc>
-                  <a:txBody>
-                    <a:bodyPr/>
-                    <a:lstStyle/>
-                    <a:p>
-                      <a:pPr marL="0" marR="0">
-                        <a:spcBef>
-                          <a:spcPts val="0"/>
-                        </a:spcBef>
-                        <a:spcAft>
-                          <a:spcPts val="0"/>
-                        </a:spcAft>
-                      </a:pPr>
-                      <a:r>
-                        <a:rPr lang="en-US" sz="1600" dirty="0" smtClean="0">
-                          <a:solidFill>
-                            <a:schemeClr val="tx1"/>
-                          </a:solidFill>
-                          <a:effectLst/>
-                        </a:rPr>
-                        <a:t>When an interface component receives focus, it does not initiate an unexpected change of context. </a:t>
-                      </a:r>
-                      <a:endParaRPr lang="en-US" sz="1600" b="1" dirty="0">
-                        <a:solidFill>
-                          <a:schemeClr val="tx1"/>
-                        </a:solidFill>
-                        <a:effectLst/>
-                        <a:latin typeface="Calibri"/>
-                        <a:ea typeface="Calibri"/>
-                        <a:cs typeface="Times New Roman"/>
-                      </a:endParaRPr>
-                    </a:p>
-                  </a:txBody>
-                  <a:tcPr marL="46599" marR="46599" marT="0" marB="0">
-                    <a:lnR w="12700" cap="flat" cmpd="sng" algn="ctr">
-                      <a:solidFill>
-                        <a:schemeClr val="tx1"/>
-                      </a:solidFill>
-                      <a:prstDash val="solid"/>
-                      <a:round/>
-                      <a:headEnd type="none" w="med" len="med"/>
-                      <a:tailEnd type="none" w="med" len="med"/>
-                    </a:lnR>
-                    <a:lnT w="12700" cap="flat" cmpd="sng" algn="ctr">
-                      <a:solidFill>
-                        <a:schemeClr val="tx1"/>
-                      </a:solidFill>
-                      <a:prstDash val="solid"/>
-                      <a:round/>
-                      <a:headEnd type="none" w="med" len="med"/>
-                      <a:tailEnd type="none" w="med" len="med"/>
-                    </a:lnT>
-                    <a:lnB w="12700" cap="flat" cmpd="sng" algn="ctr">
-                      <a:solidFill>
-                        <a:schemeClr val="tx1"/>
-                      </a:solidFill>
-                      <a:prstDash val="solid"/>
-                      <a:round/>
-                      <a:headEnd type="none" w="med" len="med"/>
-                      <a:tailEnd type="none" w="med" len="med"/>
-                    </a:lnB>
-                    <a:noFill/>
-                  </a:tcPr>
-                </a:tc>
-              </a:tr>
-            </a:tbl>
-          </a:graphicData>
-        </a:graphic>
-      </p:graphicFrame>
-      <p:sp>
-        <p:nvSpPr>
-          <p:cNvPr id="4" name="Content Placeholder 3"/>
-          <p:cNvSpPr>
+              <a:t>Notes for Focus with Frames</a:t>
+            </a:r>
+          </a:p>
+        </p:txBody>
+      </p:sp>
+      <p:sp>
+        <p:nvSpPr>
+          <p:cNvPr id="8" name="Content Placeholder 7"/>
+          <p:cNvSpPr txBox="1">
             <a:spLocks noGrp="1"/>
           </p:cNvSpPr>
           <p:nvPr>
@@ -9513,97 +9646,22 @@
         </p:nvSpPr>
         <p:spPr>
           <a:xfrm>
-            <a:off x="457200" y="1935162"/>
-            <a:ext cx="8305800" cy="1143000"/>
-          </a:xfrm>
-        </p:spPr>
-        <p:txBody>
-          <a:bodyPr>
-            <a:normAutofit fontScale="62500" lnSpcReduction="20000"/>
-          </a:bodyPr>
-          <a:lstStyle/>
-          <a:p>
-            <a:pPr marL="0" indent="0">
-              <a:buNone/>
-            </a:pPr>
-            <a:r>
-              <a:rPr lang="en-US" b="1" dirty="0"/>
-              <a:t>Evaluate Results: </a:t>
-            </a:r>
-          </a:p>
-          <a:p>
-            <a:pPr marL="0" indent="0">
-              <a:buNone/>
-            </a:pPr>
-            <a:r>
-              <a:rPr lang="en-US" dirty="0"/>
-              <a:t>If the following is </a:t>
-            </a:r>
-            <a:r>
-              <a:rPr lang="en-US" b="1" dirty="0"/>
-              <a:t>TRUE</a:t>
-            </a:r>
-            <a:r>
-              <a:rPr lang="en-US" dirty="0"/>
-              <a:t>, the content </a:t>
-            </a:r>
-            <a:r>
-              <a:rPr lang="en-US" b="1" dirty="0"/>
-              <a:t>PASSES</a:t>
-            </a:r>
-            <a:r>
-              <a:rPr lang="en-US" dirty="0"/>
-              <a:t>:</a:t>
-            </a:r>
-          </a:p>
-          <a:p>
-            <a:pPr marL="514350" lvl="0" indent="-514350">
-              <a:buFont typeface="+mj-lt"/>
-              <a:buAutoNum type="arabicPeriod"/>
-            </a:pPr>
-            <a:r>
-              <a:rPr lang="en-US" dirty="0" smtClean="0"/>
-              <a:t>An </a:t>
-            </a:r>
-            <a:r>
-              <a:rPr lang="en-US" dirty="0"/>
-              <a:t>unexpected change of context is not initiated when an interface component receives focus</a:t>
-            </a:r>
-            <a:r>
-              <a:rPr lang="en-US" dirty="0" smtClean="0"/>
-              <a:t>.</a:t>
-            </a:r>
-            <a:endParaRPr lang="en-US" dirty="0"/>
-          </a:p>
-          <a:p>
-            <a:endParaRPr lang="en-US" dirty="0"/>
-          </a:p>
-        </p:txBody>
-      </p:sp>
-      <p:sp>
-        <p:nvSpPr>
-          <p:cNvPr id="7" name="TextBox 6"/>
-          <p:cNvSpPr txBox="1"/>
-          <p:nvPr/>
-        </p:nvSpPr>
-        <p:spPr>
-          <a:xfrm>
-            <a:off x="456344" y="3105560"/>
-            <a:ext cx="8382856" cy="3447098"/>
+            <a:off x="990600" y="1600200"/>
+            <a:ext cx="7772400" cy="3551742"/>
           </a:xfrm>
           <a:prstGeom prst="rect">
             <a:avLst/>
           </a:prstGeom>
           <a:solidFill>
-            <a:schemeClr val="accent3">
-              <a:lumMod val="40000"/>
-              <a:lumOff val="60000"/>
+            <a:schemeClr val="tx2">
+              <a:lumMod val="20000"/>
+              <a:lumOff val="80000"/>
             </a:schemeClr>
           </a:solidFill>
           <a:ln w="22225">
             <a:solidFill>
-              <a:schemeClr val="accent3">
-                <a:lumMod val="50000"/>
+              <a:schemeClr val="tx2">
+                <a:lumMod val="75000"/>
               </a:schemeClr>
             </a:solidFill>
           </a:ln>
@@ -9614,112 +9672,71 @@
           </a:bodyPr>
           <a:lstStyle/>
           <a:p>
-            <a:pPr>
+            <a:pPr marL="0" indent="0">
               <a:spcBef>
                 <a:spcPts val="1200"/>
               </a:spcBef>
+              <a:buNone/>
             </a:pPr>
             <a:r>
-              <a:rPr lang="en-US" sz="2000" b="1" u="sng" dirty="0" smtClean="0"/>
-              <a:t>Definitions</a:t>
-            </a:r>
-            <a:endParaRPr lang="en-US" sz="2000" b="1" u="sng" dirty="0"/>
-          </a:p>
-          <a:p>
-            <a:pPr lvl="0"/>
-            <a:r>
-              <a:rPr lang="en-US" b="1" dirty="0" smtClean="0"/>
-              <a:t>Change of Content</a:t>
-            </a:r>
-            <a:r>
-              <a:rPr lang="en-US" dirty="0" smtClean="0"/>
-              <a:t>: The page content changes in a way that is expected related to  expanding </a:t>
-            </a:r>
-            <a:r>
-              <a:rPr lang="en-US" dirty="0"/>
-              <a:t>an outline, revealing/hiding content, or accessing a dynamic menu. </a:t>
-            </a:r>
-            <a:endParaRPr lang="en-US" dirty="0" smtClean="0"/>
-          </a:p>
-          <a:p>
-            <a:pPr lvl="0"/>
-            <a:endParaRPr lang="en-US" dirty="0"/>
-          </a:p>
-          <a:p>
-            <a:r>
-              <a:rPr lang="en-US" b="1" dirty="0" smtClean="0"/>
-              <a:t>Change of Context</a:t>
-            </a:r>
-            <a:r>
-              <a:rPr lang="en-US" dirty="0" smtClean="0"/>
-              <a:t>: There is </a:t>
-            </a:r>
-            <a:r>
-              <a:rPr lang="en-US" dirty="0"/>
-              <a:t>a major change in content that, if made without user awareness, can disorient users who are not able to view the entire page simultaneously. Examples of a change in context include:</a:t>
-            </a:r>
-          </a:p>
-          <a:p>
-            <a:pPr marL="742950" lvl="1" indent="-285750">
-              <a:buFont typeface="Arial" panose="020B0604020202020204" pitchFamily="34" charset="0"/>
-              <a:buChar char="•"/>
+              <a:rPr lang="en-US" sz="2000" b="1" u="sng" dirty="0"/>
+              <a:t>Note</a:t>
+            </a:r>
+          </a:p>
+          <a:p>
+            <a:pPr marL="0" lvl="0" indent="0">
+              <a:buNone/>
             </a:pPr>
             <a:r>
-              <a:rPr lang="en-US" dirty="0"/>
-              <a:t>Opening a new browser window.</a:t>
-            </a:r>
-          </a:p>
-          <a:p>
-            <a:pPr marL="742950" lvl="1" indent="-285750">
-              <a:buFont typeface="Arial" panose="020B0604020202020204" pitchFamily="34" charset="0"/>
-              <a:buChar char="•"/>
+              <a:rPr lang="en-US" sz="2000" dirty="0"/>
+              <a:t>To confirm keyboard focus is on a frame when there is not visible focus: </a:t>
+            </a:r>
+          </a:p>
+          <a:p>
+            <a:pPr marL="457200" lvl="0" indent="-457200">
+              <a:buFont typeface="+mj-lt"/>
+              <a:buAutoNum type="arabicPeriod"/>
             </a:pPr>
             <a:r>
-              <a:rPr lang="en-US" dirty="0"/>
-              <a:t>Moving focus to a different component.</a:t>
-            </a:r>
-          </a:p>
-          <a:p>
-            <a:pPr marL="742950" lvl="1" indent="-285750">
-              <a:buFont typeface="Arial" panose="020B0604020202020204" pitchFamily="34" charset="0"/>
-              <a:buChar char="•"/>
+              <a:rPr lang="en-US" sz="1800" dirty="0"/>
+              <a:t>Use the TAB and SHIFT + TAB combination to deduce that the keyboard focus is on the frame. </a:t>
+            </a:r>
+          </a:p>
+          <a:p>
+            <a:pPr marL="457200" lvl="0" indent="-457200">
+              <a:buFont typeface="+mj-lt"/>
+              <a:buAutoNum type="arabicPeriod"/>
             </a:pPr>
             <a:r>
-              <a:rPr lang="en-US" dirty="0"/>
-              <a:t>Submitting a form automatically when a component receives focus.</a:t>
-            </a:r>
-          </a:p>
-          <a:p>
-            <a:pPr marL="742950" lvl="1" indent="-285750">
-              <a:buFont typeface="Arial" panose="020B0604020202020204" pitchFamily="34" charset="0"/>
-              <a:buChar char="•"/>
+              <a:rPr lang="en-US" sz="1800" dirty="0"/>
+              <a:t>When on the frame, a tab forward should move focus to the first keyboard focusable element within the frame. </a:t>
+            </a:r>
+          </a:p>
+          <a:p>
+            <a:pPr marL="457200" lvl="0" indent="-457200">
+              <a:buFont typeface="+mj-lt"/>
+              <a:buAutoNum type="arabicPeriod"/>
             </a:pPr>
             <a:r>
-              <a:rPr lang="en-US" dirty="0"/>
-              <a:t>Going to a new web page or window, or appearing to do so.</a:t>
-            </a:r>
-          </a:p>
-          <a:p>
-            <a:pPr marL="742950" lvl="1" indent="-285750">
-              <a:buFont typeface="Arial" panose="020B0604020202020204" pitchFamily="34" charset="0"/>
-              <a:buChar char="•"/>
+              <a:rPr lang="en-US" sz="1800" dirty="0"/>
+              <a:t>From there, SHIFT + TAB once to move back to the frame and another SHIFT + TAB  should move focus to a keyboard focusable element before the frame. </a:t>
+            </a:r>
+          </a:p>
+          <a:p>
+            <a:pPr marL="0" lvl="0" indent="0">
+              <a:buNone/>
             </a:pPr>
             <a:r>
-              <a:rPr lang="en-US" dirty="0"/>
-              <a:t>Significantly rearranging the content of the page</a:t>
-            </a:r>
-            <a:r>
-              <a:rPr lang="en-US" dirty="0" smtClean="0"/>
-              <a:t>.</a:t>
-            </a:r>
-            <a:endParaRPr lang="en-US" dirty="0"/>
+              <a:rPr lang="en-US" sz="2000" dirty="0"/>
+              <a:t>Only the frame is permitted to not have a visible focus. Be certain it is the frame that does not have a visible focus and not another element.</a:t>
+            </a:r>
           </a:p>
         </p:txBody>
       </p:sp>
     </p:spTree>
     <p:extLst>
       <p:ext uri="{BB962C8B-B14F-4D97-AF65-F5344CB8AC3E}">
-        <p14:creationId xmlns:p14="http://schemas.microsoft.com/office/powerpoint/2010/main" val="1448557812"/>
+        <p14:creationId xmlns:p14="http://schemas.microsoft.com/office/powerpoint/2010/main" val="2442417761"/>
       </p:ext>
     </p:extLst>
   </p:cSld>

</xml_diff>